<commit_message>
improving plots, add icons, color phylo tree in
</commit_message>
<xml_diff>
--- a/03_OUTPUT/01_Goal 0/phylo tree families.pptx
+++ b/03_OUTPUT/01_Goal 0/phylo tree families.pptx
@@ -4,11 +4,15 @@
   <p:sldMasterIdLst>
     <p:sldMasterId id="2147483684" r:id="rId1"/>
   </p:sldMasterIdLst>
+  <p:notesMasterIdLst>
+    <p:notesMasterId r:id="rId7"/>
+  </p:notesMasterIdLst>
   <p:sldIdLst>
     <p:sldId id="256" r:id="rId2"/>
-    <p:sldId id="257" r:id="rId3"/>
-    <p:sldId id="258" r:id="rId4"/>
-    <p:sldId id="259" r:id="rId5"/>
+    <p:sldId id="260" r:id="rId3"/>
+    <p:sldId id="257" r:id="rId4"/>
+    <p:sldId id="258" r:id="rId5"/>
+    <p:sldId id="259" r:id="rId6"/>
   </p:sldIdLst>
   <p:sldSz cx="14400213" cy="10799763"/>
   <p:notesSz cx="6858000" cy="9144000"/>
@@ -107,7 +111,446 @@
       </a:defRPr>
     </a:lvl9pPr>
   </p:defaultTextStyle>
+  <p:extLst>
+    <p:ext uri="{EFAFB233-063F-42B5-8137-9DF3F51BA10A}">
+      <p15:sldGuideLst xmlns:p15="http://schemas.microsoft.com/office/powerpoint/2012/main"/>
+    </p:ext>
+  </p:extLst>
 </p:presentation>
+</file>
+
+<file path=ppt/notesMasters/notesMaster1.xml><?xml version="1.0" encoding="utf-8"?>
+<p:notesMaster xmlns:a="http://schemas.openxmlformats.org/drawingml/2006/main" xmlns:r="http://schemas.openxmlformats.org/officeDocument/2006/relationships" xmlns:p="http://schemas.openxmlformats.org/presentationml/2006/main">
+  <p:cSld>
+    <p:bg>
+      <p:bgRef idx="1001">
+        <a:schemeClr val="bg1"/>
+      </p:bgRef>
+    </p:bg>
+    <p:spTree>
+      <p:nvGrpSpPr>
+        <p:cNvPr id="1" name=""/>
+        <p:cNvGrpSpPr/>
+        <p:nvPr/>
+      </p:nvGrpSpPr>
+      <p:grpSpPr>
+        <a:xfrm>
+          <a:off x="0" y="0"/>
+          <a:ext cx="0" cy="0"/>
+          <a:chOff x="0" y="0"/>
+          <a:chExt cx="0" cy="0"/>
+        </a:xfrm>
+      </p:grpSpPr>
+      <p:sp>
+        <p:nvSpPr>
+          <p:cNvPr id="2" name="Header Placeholder 1"/>
+          <p:cNvSpPr>
+            <a:spLocks noGrp="1"/>
+          </p:cNvSpPr>
+          <p:nvPr>
+            <p:ph type="hdr" sz="quarter"/>
+          </p:nvPr>
+        </p:nvSpPr>
+        <p:spPr>
+          <a:xfrm>
+            <a:off x="0" y="0"/>
+            <a:ext cx="2971800" cy="458788"/>
+          </a:xfrm>
+          <a:prstGeom prst="rect">
+            <a:avLst/>
+          </a:prstGeom>
+        </p:spPr>
+        <p:txBody>
+          <a:bodyPr vert="horz" lIns="91440" tIns="45720" rIns="91440" bIns="45720" rtlCol="0"/>
+          <a:lstStyle>
+            <a:lvl1pPr algn="l">
+              <a:defRPr sz="1200"/>
+            </a:lvl1pPr>
+          </a:lstStyle>
+          <a:p>
+            <a:endParaRPr lang="en-GB"/>
+          </a:p>
+        </p:txBody>
+      </p:sp>
+      <p:sp>
+        <p:nvSpPr>
+          <p:cNvPr id="3" name="Date Placeholder 2"/>
+          <p:cNvSpPr>
+            <a:spLocks noGrp="1"/>
+          </p:cNvSpPr>
+          <p:nvPr>
+            <p:ph type="dt" idx="1"/>
+          </p:nvPr>
+        </p:nvSpPr>
+        <p:spPr>
+          <a:xfrm>
+            <a:off x="3884613" y="0"/>
+            <a:ext cx="2971800" cy="458788"/>
+          </a:xfrm>
+          <a:prstGeom prst="rect">
+            <a:avLst/>
+          </a:prstGeom>
+        </p:spPr>
+        <p:txBody>
+          <a:bodyPr vert="horz" lIns="91440" tIns="45720" rIns="91440" bIns="45720" rtlCol="0"/>
+          <a:lstStyle>
+            <a:lvl1pPr algn="r">
+              <a:defRPr sz="1200"/>
+            </a:lvl1pPr>
+          </a:lstStyle>
+          <a:p>
+            <a:fld id="{2E8D730D-6B37-2740-B385-DED5B7389B09}" type="datetimeFigureOut">
+              <a:rPr lang="en-GB" smtClean="0"/>
+              <a:t>21/12/2022</a:t>
+            </a:fld>
+            <a:endParaRPr lang="en-GB"/>
+          </a:p>
+        </p:txBody>
+      </p:sp>
+      <p:sp>
+        <p:nvSpPr>
+          <p:cNvPr id="4" name="Slide Image Placeholder 3"/>
+          <p:cNvSpPr>
+            <a:spLocks noGrp="1" noRot="1" noChangeAspect="1"/>
+          </p:cNvSpPr>
+          <p:nvPr>
+            <p:ph type="sldImg" idx="2"/>
+          </p:nvPr>
+        </p:nvSpPr>
+        <p:spPr>
+          <a:xfrm>
+            <a:off x="1371600" y="1143000"/>
+            <a:ext cx="4114800" cy="3086100"/>
+          </a:xfrm>
+          <a:prstGeom prst="rect">
+            <a:avLst/>
+          </a:prstGeom>
+          <a:noFill/>
+          <a:ln w="12700">
+            <a:solidFill>
+              <a:prstClr val="black"/>
+            </a:solidFill>
+          </a:ln>
+        </p:spPr>
+        <p:txBody>
+          <a:bodyPr vert="horz" lIns="91440" tIns="45720" rIns="91440" bIns="45720" rtlCol="0" anchor="ctr"/>
+          <a:lstStyle/>
+          <a:p>
+            <a:endParaRPr lang="en-GB"/>
+          </a:p>
+        </p:txBody>
+      </p:sp>
+      <p:sp>
+        <p:nvSpPr>
+          <p:cNvPr id="5" name="Notes Placeholder 4"/>
+          <p:cNvSpPr>
+            <a:spLocks noGrp="1"/>
+          </p:cNvSpPr>
+          <p:nvPr>
+            <p:ph type="body" sz="quarter" idx="3"/>
+          </p:nvPr>
+        </p:nvSpPr>
+        <p:spPr>
+          <a:xfrm>
+            <a:off x="685800" y="4400550"/>
+            <a:ext cx="5486400" cy="3600450"/>
+          </a:xfrm>
+          <a:prstGeom prst="rect">
+            <a:avLst/>
+          </a:prstGeom>
+        </p:spPr>
+        <p:txBody>
+          <a:bodyPr vert="horz" lIns="91440" tIns="45720" rIns="91440" bIns="45720" rtlCol="0"/>
+          <a:lstStyle/>
+          <a:p>
+            <a:pPr lvl="0"/>
+            <a:r>
+              <a:rPr lang="en-US"/>
+              <a:t>Click to edit Master text styles</a:t>
+            </a:r>
+          </a:p>
+          <a:p>
+            <a:pPr lvl="1"/>
+            <a:r>
+              <a:rPr lang="en-US"/>
+              <a:t>Second level</a:t>
+            </a:r>
+          </a:p>
+          <a:p>
+            <a:pPr lvl="2"/>
+            <a:r>
+              <a:rPr lang="en-US"/>
+              <a:t>Third level</a:t>
+            </a:r>
+          </a:p>
+          <a:p>
+            <a:pPr lvl="3"/>
+            <a:r>
+              <a:rPr lang="en-US"/>
+              <a:t>Fourth level</a:t>
+            </a:r>
+          </a:p>
+          <a:p>
+            <a:pPr lvl="4"/>
+            <a:r>
+              <a:rPr lang="en-US"/>
+              <a:t>Fifth level</a:t>
+            </a:r>
+            <a:endParaRPr lang="en-GB"/>
+          </a:p>
+        </p:txBody>
+      </p:sp>
+      <p:sp>
+        <p:nvSpPr>
+          <p:cNvPr id="6" name="Footer Placeholder 5"/>
+          <p:cNvSpPr>
+            <a:spLocks noGrp="1"/>
+          </p:cNvSpPr>
+          <p:nvPr>
+            <p:ph type="ftr" sz="quarter" idx="4"/>
+          </p:nvPr>
+        </p:nvSpPr>
+        <p:spPr>
+          <a:xfrm>
+            <a:off x="0" y="8685213"/>
+            <a:ext cx="2971800" cy="458787"/>
+          </a:xfrm>
+          <a:prstGeom prst="rect">
+            <a:avLst/>
+          </a:prstGeom>
+        </p:spPr>
+        <p:txBody>
+          <a:bodyPr vert="horz" lIns="91440" tIns="45720" rIns="91440" bIns="45720" rtlCol="0" anchor="b"/>
+          <a:lstStyle>
+            <a:lvl1pPr algn="l">
+              <a:defRPr sz="1200"/>
+            </a:lvl1pPr>
+          </a:lstStyle>
+          <a:p>
+            <a:endParaRPr lang="en-GB"/>
+          </a:p>
+        </p:txBody>
+      </p:sp>
+      <p:sp>
+        <p:nvSpPr>
+          <p:cNvPr id="7" name="Slide Number Placeholder 6"/>
+          <p:cNvSpPr>
+            <a:spLocks noGrp="1"/>
+          </p:cNvSpPr>
+          <p:nvPr>
+            <p:ph type="sldNum" sz="quarter" idx="5"/>
+          </p:nvPr>
+        </p:nvSpPr>
+        <p:spPr>
+          <a:xfrm>
+            <a:off x="3884613" y="8685213"/>
+            <a:ext cx="2971800" cy="458787"/>
+          </a:xfrm>
+          <a:prstGeom prst="rect">
+            <a:avLst/>
+          </a:prstGeom>
+        </p:spPr>
+        <p:txBody>
+          <a:bodyPr vert="horz" lIns="91440" tIns="45720" rIns="91440" bIns="45720" rtlCol="0" anchor="b"/>
+          <a:lstStyle>
+            <a:lvl1pPr algn="r">
+              <a:defRPr sz="1200"/>
+            </a:lvl1pPr>
+          </a:lstStyle>
+          <a:p>
+            <a:fld id="{B98D7A2B-9D79-BB4A-B91B-5C404C6D0DCB}" type="slidenum">
+              <a:rPr lang="en-GB" smtClean="0"/>
+              <a:t>‹#›</a:t>
+            </a:fld>
+            <a:endParaRPr lang="en-GB"/>
+          </a:p>
+        </p:txBody>
+      </p:sp>
+    </p:spTree>
+    <p:extLst>
+      <p:ext uri="{BB962C8B-B14F-4D97-AF65-F5344CB8AC3E}">
+        <p14:creationId xmlns:p14="http://schemas.microsoft.com/office/powerpoint/2010/main" val="3975278243"/>
+      </p:ext>
+    </p:extLst>
+  </p:cSld>
+  <p:clrMap bg1="lt1" tx1="dk1" bg2="lt2" tx2="dk2" accent1="accent1" accent2="accent2" accent3="accent3" accent4="accent4" accent5="accent5" accent6="accent6" hlink="hlink" folHlink="folHlink"/>
+  <p:notesStyle>
+    <a:lvl1pPr marL="0" algn="l" defTabSz="914400" rtl="0" eaLnBrk="1" latinLnBrk="0" hangingPunct="1">
+      <a:defRPr sz="1200" kern="1200">
+        <a:solidFill>
+          <a:schemeClr val="tx1"/>
+        </a:solidFill>
+        <a:latin typeface="+mn-lt"/>
+        <a:ea typeface="+mn-ea"/>
+        <a:cs typeface="+mn-cs"/>
+      </a:defRPr>
+    </a:lvl1pPr>
+    <a:lvl2pPr marL="457200" algn="l" defTabSz="914400" rtl="0" eaLnBrk="1" latinLnBrk="0" hangingPunct="1">
+      <a:defRPr sz="1200" kern="1200">
+        <a:solidFill>
+          <a:schemeClr val="tx1"/>
+        </a:solidFill>
+        <a:latin typeface="+mn-lt"/>
+        <a:ea typeface="+mn-ea"/>
+        <a:cs typeface="+mn-cs"/>
+      </a:defRPr>
+    </a:lvl2pPr>
+    <a:lvl3pPr marL="914400" algn="l" defTabSz="914400" rtl="0" eaLnBrk="1" latinLnBrk="0" hangingPunct="1">
+      <a:defRPr sz="1200" kern="1200">
+        <a:solidFill>
+          <a:schemeClr val="tx1"/>
+        </a:solidFill>
+        <a:latin typeface="+mn-lt"/>
+        <a:ea typeface="+mn-ea"/>
+        <a:cs typeface="+mn-cs"/>
+      </a:defRPr>
+    </a:lvl3pPr>
+    <a:lvl4pPr marL="1371600" algn="l" defTabSz="914400" rtl="0" eaLnBrk="1" latinLnBrk="0" hangingPunct="1">
+      <a:defRPr sz="1200" kern="1200">
+        <a:solidFill>
+          <a:schemeClr val="tx1"/>
+        </a:solidFill>
+        <a:latin typeface="+mn-lt"/>
+        <a:ea typeface="+mn-ea"/>
+        <a:cs typeface="+mn-cs"/>
+      </a:defRPr>
+    </a:lvl4pPr>
+    <a:lvl5pPr marL="1828800" algn="l" defTabSz="914400" rtl="0" eaLnBrk="1" latinLnBrk="0" hangingPunct="1">
+      <a:defRPr sz="1200" kern="1200">
+        <a:solidFill>
+          <a:schemeClr val="tx1"/>
+        </a:solidFill>
+        <a:latin typeface="+mn-lt"/>
+        <a:ea typeface="+mn-ea"/>
+        <a:cs typeface="+mn-cs"/>
+      </a:defRPr>
+    </a:lvl5pPr>
+    <a:lvl6pPr marL="2286000" algn="l" defTabSz="914400" rtl="0" eaLnBrk="1" latinLnBrk="0" hangingPunct="1">
+      <a:defRPr sz="1200" kern="1200">
+        <a:solidFill>
+          <a:schemeClr val="tx1"/>
+        </a:solidFill>
+        <a:latin typeface="+mn-lt"/>
+        <a:ea typeface="+mn-ea"/>
+        <a:cs typeface="+mn-cs"/>
+      </a:defRPr>
+    </a:lvl6pPr>
+    <a:lvl7pPr marL="2743200" algn="l" defTabSz="914400" rtl="0" eaLnBrk="1" latinLnBrk="0" hangingPunct="1">
+      <a:defRPr sz="1200" kern="1200">
+        <a:solidFill>
+          <a:schemeClr val="tx1"/>
+        </a:solidFill>
+        <a:latin typeface="+mn-lt"/>
+        <a:ea typeface="+mn-ea"/>
+        <a:cs typeface="+mn-cs"/>
+      </a:defRPr>
+    </a:lvl7pPr>
+    <a:lvl8pPr marL="3200400" algn="l" defTabSz="914400" rtl="0" eaLnBrk="1" latinLnBrk="0" hangingPunct="1">
+      <a:defRPr sz="1200" kern="1200">
+        <a:solidFill>
+          <a:schemeClr val="tx1"/>
+        </a:solidFill>
+        <a:latin typeface="+mn-lt"/>
+        <a:ea typeface="+mn-ea"/>
+        <a:cs typeface="+mn-cs"/>
+      </a:defRPr>
+    </a:lvl8pPr>
+    <a:lvl9pPr marL="3657600" algn="l" defTabSz="914400" rtl="0" eaLnBrk="1" latinLnBrk="0" hangingPunct="1">
+      <a:defRPr sz="1200" kern="1200">
+        <a:solidFill>
+          <a:schemeClr val="tx1"/>
+        </a:solidFill>
+        <a:latin typeface="+mn-lt"/>
+        <a:ea typeface="+mn-ea"/>
+        <a:cs typeface="+mn-cs"/>
+      </a:defRPr>
+    </a:lvl9pPr>
+  </p:notesStyle>
+</p:notesMaster>
+</file>
+
+<file path=ppt/notesSlides/notesSlide1.xml><?xml version="1.0" encoding="utf-8"?>
+<p:notes xmlns:a="http://schemas.openxmlformats.org/drawingml/2006/main" xmlns:r="http://schemas.openxmlformats.org/officeDocument/2006/relationships" xmlns:p="http://schemas.openxmlformats.org/presentationml/2006/main">
+  <p:cSld>
+    <p:spTree>
+      <p:nvGrpSpPr>
+        <p:cNvPr id="1" name=""/>
+        <p:cNvGrpSpPr/>
+        <p:nvPr/>
+      </p:nvGrpSpPr>
+      <p:grpSpPr>
+        <a:xfrm>
+          <a:off x="0" y="0"/>
+          <a:ext cx="0" cy="0"/>
+          <a:chOff x="0" y="0"/>
+          <a:chExt cx="0" cy="0"/>
+        </a:xfrm>
+      </p:grpSpPr>
+      <p:sp>
+        <p:nvSpPr>
+          <p:cNvPr id="2" name="Slide Image Placeholder 1"/>
+          <p:cNvSpPr>
+            <a:spLocks noGrp="1" noRot="1" noChangeAspect="1"/>
+          </p:cNvSpPr>
+          <p:nvPr>
+            <p:ph type="sldImg"/>
+          </p:nvPr>
+        </p:nvSpPr>
+        <p:spPr/>
+      </p:sp>
+      <p:sp>
+        <p:nvSpPr>
+          <p:cNvPr id="3" name="Notes Placeholder 2"/>
+          <p:cNvSpPr>
+            <a:spLocks noGrp="1"/>
+          </p:cNvSpPr>
+          <p:nvPr>
+            <p:ph type="body" idx="1"/>
+          </p:nvPr>
+        </p:nvSpPr>
+        <p:spPr/>
+        <p:txBody>
+          <a:bodyPr/>
+          <a:lstStyle/>
+          <a:p>
+            <a:endParaRPr lang="en-GB" dirty="0"/>
+          </a:p>
+        </p:txBody>
+      </p:sp>
+      <p:sp>
+        <p:nvSpPr>
+          <p:cNvPr id="4" name="Slide Number Placeholder 3"/>
+          <p:cNvSpPr>
+            <a:spLocks noGrp="1"/>
+          </p:cNvSpPr>
+          <p:nvPr>
+            <p:ph type="sldNum" sz="quarter" idx="5"/>
+          </p:nvPr>
+        </p:nvSpPr>
+        <p:spPr/>
+        <p:txBody>
+          <a:bodyPr/>
+          <a:lstStyle/>
+          <a:p>
+            <a:fld id="{B98D7A2B-9D79-BB4A-B91B-5C404C6D0DCB}" type="slidenum">
+              <a:rPr lang="en-GB" smtClean="0"/>
+              <a:t>2</a:t>
+            </a:fld>
+            <a:endParaRPr lang="en-GB"/>
+          </a:p>
+        </p:txBody>
+      </p:sp>
+    </p:spTree>
+    <p:extLst>
+      <p:ext uri="{BB962C8B-B14F-4D97-AF65-F5344CB8AC3E}">
+        <p14:creationId xmlns:p14="http://schemas.microsoft.com/office/powerpoint/2010/main" val="70611232"/>
+      </p:ext>
+    </p:extLst>
+  </p:cSld>
+  <p:clrMapOvr>
+    <a:masterClrMapping/>
+  </p:clrMapOvr>
+</p:notes>
 </file>
 
 <file path=ppt/slideLayouts/slideLayout1.xml><?xml version="1.0" encoding="utf-8"?>
@@ -241,7 +684,7 @@
           <a:p>
             <a:fld id="{ED9ECA61-D02B-9F4F-A215-85F3C03B6418}" type="datetimeFigureOut">
               <a:rPr lang="en-GB" smtClean="0"/>
-              <a:t>20/12/2022</a:t>
+              <a:t>21/12/2022</a:t>
             </a:fld>
             <a:endParaRPr lang="en-GB"/>
           </a:p>
@@ -411,7 +854,7 @@
           <a:p>
             <a:fld id="{ED9ECA61-D02B-9F4F-A215-85F3C03B6418}" type="datetimeFigureOut">
               <a:rPr lang="en-GB" smtClean="0"/>
-              <a:t>20/12/2022</a:t>
+              <a:t>21/12/2022</a:t>
             </a:fld>
             <a:endParaRPr lang="en-GB"/>
           </a:p>
@@ -591,7 +1034,7 @@
           <a:p>
             <a:fld id="{ED9ECA61-D02B-9F4F-A215-85F3C03B6418}" type="datetimeFigureOut">
               <a:rPr lang="en-GB" smtClean="0"/>
-              <a:t>20/12/2022</a:t>
+              <a:t>21/12/2022</a:t>
             </a:fld>
             <a:endParaRPr lang="en-GB"/>
           </a:p>
@@ -761,7 +1204,7 @@
           <a:p>
             <a:fld id="{ED9ECA61-D02B-9F4F-A215-85F3C03B6418}" type="datetimeFigureOut">
               <a:rPr lang="en-GB" smtClean="0"/>
-              <a:t>20/12/2022</a:t>
+              <a:t>21/12/2022</a:t>
             </a:fld>
             <a:endParaRPr lang="en-GB"/>
           </a:p>
@@ -1005,7 +1448,7 @@
           <a:p>
             <a:fld id="{ED9ECA61-D02B-9F4F-A215-85F3C03B6418}" type="datetimeFigureOut">
               <a:rPr lang="en-GB" smtClean="0"/>
-              <a:t>20/12/2022</a:t>
+              <a:t>21/12/2022</a:t>
             </a:fld>
             <a:endParaRPr lang="en-GB"/>
           </a:p>
@@ -1237,7 +1680,7 @@
           <a:p>
             <a:fld id="{ED9ECA61-D02B-9F4F-A215-85F3C03B6418}" type="datetimeFigureOut">
               <a:rPr lang="en-GB" smtClean="0"/>
-              <a:t>20/12/2022</a:t>
+              <a:t>21/12/2022</a:t>
             </a:fld>
             <a:endParaRPr lang="en-GB"/>
           </a:p>
@@ -1604,7 +2047,7 @@
           <a:p>
             <a:fld id="{ED9ECA61-D02B-9F4F-A215-85F3C03B6418}" type="datetimeFigureOut">
               <a:rPr lang="en-GB" smtClean="0"/>
-              <a:t>20/12/2022</a:t>
+              <a:t>21/12/2022</a:t>
             </a:fld>
             <a:endParaRPr lang="en-GB"/>
           </a:p>
@@ -1722,7 +2165,7 @@
           <a:p>
             <a:fld id="{ED9ECA61-D02B-9F4F-A215-85F3C03B6418}" type="datetimeFigureOut">
               <a:rPr lang="en-GB" smtClean="0"/>
-              <a:t>20/12/2022</a:t>
+              <a:t>21/12/2022</a:t>
             </a:fld>
             <a:endParaRPr lang="en-GB"/>
           </a:p>
@@ -1817,7 +2260,7 @@
           <a:p>
             <a:fld id="{ED9ECA61-D02B-9F4F-A215-85F3C03B6418}" type="datetimeFigureOut">
               <a:rPr lang="en-GB" smtClean="0"/>
-              <a:t>20/12/2022</a:t>
+              <a:t>21/12/2022</a:t>
             </a:fld>
             <a:endParaRPr lang="en-GB"/>
           </a:p>
@@ -2094,7 +2537,7 @@
           <a:p>
             <a:fld id="{ED9ECA61-D02B-9F4F-A215-85F3C03B6418}" type="datetimeFigureOut">
               <a:rPr lang="en-GB" smtClean="0"/>
-              <a:t>20/12/2022</a:t>
+              <a:t>21/12/2022</a:t>
             </a:fld>
             <a:endParaRPr lang="en-GB"/>
           </a:p>
@@ -2351,7 +2794,7 @@
           <a:p>
             <a:fld id="{ED9ECA61-D02B-9F4F-A215-85F3C03B6418}" type="datetimeFigureOut">
               <a:rPr lang="en-GB" smtClean="0"/>
-              <a:t>20/12/2022</a:t>
+              <a:t>21/12/2022</a:t>
             </a:fld>
             <a:endParaRPr lang="en-GB"/>
           </a:p>
@@ -2564,7 +3007,7 @@
           <a:p>
             <a:fld id="{ED9ECA61-D02B-9F4F-A215-85F3C03B6418}" type="datetimeFigureOut">
               <a:rPr lang="en-GB" smtClean="0"/>
-              <a:t>20/12/2022</a:t>
+              <a:t>21/12/2022</a:t>
             </a:fld>
             <a:endParaRPr lang="en-GB"/>
           </a:p>
@@ -5123,56 +5566,2312 @@
           <a:chExt cx="0" cy="0"/>
         </a:xfrm>
       </p:grpSpPr>
-      <p:sp>
-        <p:nvSpPr>
-          <p:cNvPr id="2" name="Title 1">
+      <p:pic>
+        <p:nvPicPr>
+          <p:cNvPr id="17" name="Picture 16">
             <a:extLst>
               <a:ext uri="{FF2B5EF4-FFF2-40B4-BE49-F238E27FC236}">
-                <a16:creationId xmlns:a16="http://schemas.microsoft.com/office/drawing/2014/main" id="{274D112C-5D37-663D-526B-DF7DB2F790CE}"/>
+                <a16:creationId xmlns:a16="http://schemas.microsoft.com/office/drawing/2014/main" id="{4DCC5098-D28E-BEBA-177A-2ACBDFC97D26}"/>
               </a:ext>
             </a:extLst>
           </p:cNvPr>
-          <p:cNvSpPr>
-            <a:spLocks noGrp="1"/>
-          </p:cNvSpPr>
-          <p:nvPr>
-            <p:ph type="title"/>
-          </p:nvPr>
-        </p:nvSpPr>
-        <p:spPr/>
-        <p:txBody>
-          <a:bodyPr/>
-          <a:lstStyle/>
-          <a:p>
-            <a:endParaRPr lang="en-GB"/>
-          </a:p>
-        </p:txBody>
-      </p:sp>
-      <p:sp>
-        <p:nvSpPr>
-          <p:cNvPr id="3" name="Content Placeholder 2">
+          <p:cNvPicPr>
+            <a:picLocks noChangeAspect="1"/>
+          </p:cNvPicPr>
+          <p:nvPr/>
+        </p:nvPicPr>
+        <p:blipFill rotWithShape="1">
+          <a:blip r:embed="rId3"/>
+          <a:srcRect l="11746" t="8957" r="14571" b="10929"/>
+          <a:stretch/>
+        </p:blipFill>
+        <p:spPr>
+          <a:xfrm>
+            <a:off x="417178" y="563809"/>
+            <a:ext cx="6782928" cy="9606414"/>
+          </a:xfrm>
+          <a:prstGeom prst="rect">
+            <a:avLst/>
+          </a:prstGeom>
+        </p:spPr>
+      </p:pic>
+      <p:sp>
+        <p:nvSpPr>
+          <p:cNvPr id="92" name="Rectangle 91">
             <a:extLst>
               <a:ext uri="{FF2B5EF4-FFF2-40B4-BE49-F238E27FC236}">
-                <a16:creationId xmlns:a16="http://schemas.microsoft.com/office/drawing/2014/main" id="{FA91C2DE-7FE6-497B-9342-4F4BD197F214}"/>
+                <a16:creationId xmlns:a16="http://schemas.microsoft.com/office/drawing/2014/main" id="{613307CA-6E2A-5C85-8FD0-6ACC188FCC69}"/>
               </a:ext>
             </a:extLst>
           </p:cNvPr>
-          <p:cNvSpPr>
-            <a:spLocks noGrp="1"/>
-          </p:cNvSpPr>
+          <p:cNvSpPr/>
+          <p:nvPr/>
+        </p:nvSpPr>
+        <p:spPr>
+          <a:xfrm>
+            <a:off x="5892335" y="675600"/>
+            <a:ext cx="362967" cy="79200"/>
+          </a:xfrm>
+          <a:prstGeom prst="rect">
+            <a:avLst/>
+          </a:prstGeom>
+          <a:solidFill>
+            <a:srgbClr val="4F6457"/>
+          </a:solidFill>
+          <a:ln>
+            <a:solidFill>
+              <a:srgbClr val="4F6457"/>
+            </a:solidFill>
+          </a:ln>
+        </p:spPr>
+        <p:style>
+          <a:lnRef idx="2">
+            <a:schemeClr val="accent1">
+              <a:shade val="50000"/>
+            </a:schemeClr>
+          </a:lnRef>
+          <a:fillRef idx="1">
+            <a:schemeClr val="accent1"/>
+          </a:fillRef>
+          <a:effectRef idx="0">
+            <a:schemeClr val="accent1"/>
+          </a:effectRef>
+          <a:fontRef idx="minor">
+            <a:schemeClr val="lt1"/>
+          </a:fontRef>
+        </p:style>
+        <p:txBody>
+          <a:bodyPr rtlCol="0" anchor="ctr"/>
+          <a:lstStyle/>
+          <a:p>
+            <a:pPr algn="ctr"/>
+            <a:endParaRPr lang="en-GB" sz="3600" dirty="0">
+              <a:highlight>
+                <a:srgbClr val="4F6457"/>
+              </a:highlight>
+            </a:endParaRPr>
+          </a:p>
+        </p:txBody>
+      </p:sp>
+      <p:sp>
+        <p:nvSpPr>
+          <p:cNvPr id="93" name="Rectangle 92">
+            <a:extLst>
+              <a:ext uri="{FF2B5EF4-FFF2-40B4-BE49-F238E27FC236}">
+                <a16:creationId xmlns:a16="http://schemas.microsoft.com/office/drawing/2014/main" id="{FE86645F-99F9-5722-94D1-B039CB59288C}"/>
+              </a:ext>
+            </a:extLst>
+          </p:cNvPr>
+          <p:cNvSpPr/>
+          <p:nvPr/>
+        </p:nvSpPr>
+        <p:spPr>
+          <a:xfrm>
+            <a:off x="5892335" y="766270"/>
+            <a:ext cx="362967" cy="368147"/>
+          </a:xfrm>
+          <a:prstGeom prst="rect">
+            <a:avLst/>
+          </a:prstGeom>
+          <a:solidFill>
+            <a:srgbClr val="C4DFE6"/>
+          </a:solidFill>
+          <a:ln>
+            <a:solidFill>
+              <a:srgbClr val="C4DFE6"/>
+            </a:solidFill>
+          </a:ln>
+        </p:spPr>
+        <p:style>
+          <a:lnRef idx="2">
+            <a:schemeClr val="accent1">
+              <a:shade val="50000"/>
+            </a:schemeClr>
+          </a:lnRef>
+          <a:fillRef idx="1">
+            <a:schemeClr val="accent1"/>
+          </a:fillRef>
+          <a:effectRef idx="0">
+            <a:schemeClr val="accent1"/>
+          </a:effectRef>
+          <a:fontRef idx="minor">
+            <a:schemeClr val="lt1"/>
+          </a:fontRef>
+        </p:style>
+        <p:txBody>
+          <a:bodyPr rtlCol="0" anchor="ctr"/>
+          <a:lstStyle/>
+          <a:p>
+            <a:pPr algn="ctr"/>
+            <a:endParaRPr lang="en-GB" sz="3600" dirty="0"/>
+          </a:p>
+        </p:txBody>
+      </p:sp>
+      <p:sp>
+        <p:nvSpPr>
+          <p:cNvPr id="94" name="Rectangle 93">
+            <a:extLst>
+              <a:ext uri="{FF2B5EF4-FFF2-40B4-BE49-F238E27FC236}">
+                <a16:creationId xmlns:a16="http://schemas.microsoft.com/office/drawing/2014/main" id="{06C44CAD-69B2-87FE-4F49-05709448918E}"/>
+              </a:ext>
+            </a:extLst>
+          </p:cNvPr>
+          <p:cNvSpPr/>
+          <p:nvPr/>
+        </p:nvSpPr>
+        <p:spPr>
+          <a:xfrm>
+            <a:off x="5892335" y="1127038"/>
+            <a:ext cx="362967" cy="45719"/>
+          </a:xfrm>
+          <a:prstGeom prst="rect">
+            <a:avLst/>
+          </a:prstGeom>
+          <a:solidFill>
+            <a:srgbClr val="4F6457"/>
+          </a:solidFill>
+          <a:ln>
+            <a:solidFill>
+              <a:srgbClr val="4F6457"/>
+            </a:solidFill>
+          </a:ln>
+        </p:spPr>
+        <p:style>
+          <a:lnRef idx="2">
+            <a:schemeClr val="accent1">
+              <a:shade val="50000"/>
+            </a:schemeClr>
+          </a:lnRef>
+          <a:fillRef idx="1">
+            <a:schemeClr val="accent1"/>
+          </a:fillRef>
+          <a:effectRef idx="0">
+            <a:schemeClr val="accent1"/>
+          </a:effectRef>
+          <a:fontRef idx="minor">
+            <a:schemeClr val="lt1"/>
+          </a:fontRef>
+        </p:style>
+        <p:txBody>
+          <a:bodyPr rtlCol="0" anchor="ctr"/>
+          <a:lstStyle/>
+          <a:p>
+            <a:pPr algn="ctr"/>
+            <a:endParaRPr lang="en-GB" sz="3600" dirty="0"/>
+          </a:p>
+        </p:txBody>
+      </p:sp>
+      <p:sp>
+        <p:nvSpPr>
+          <p:cNvPr id="95" name="Rectangle 94">
+            <a:extLst>
+              <a:ext uri="{FF2B5EF4-FFF2-40B4-BE49-F238E27FC236}">
+                <a16:creationId xmlns:a16="http://schemas.microsoft.com/office/drawing/2014/main" id="{AC8E8320-B550-F382-8AED-E96781F5B632}"/>
+              </a:ext>
+            </a:extLst>
+          </p:cNvPr>
+          <p:cNvSpPr/>
+          <p:nvPr/>
+        </p:nvSpPr>
+        <p:spPr>
+          <a:xfrm>
+            <a:off x="5892335" y="1172757"/>
+            <a:ext cx="362967" cy="79200"/>
+          </a:xfrm>
+          <a:prstGeom prst="rect">
+            <a:avLst/>
+          </a:prstGeom>
+          <a:solidFill>
+            <a:schemeClr val="tx1"/>
+          </a:solidFill>
+          <a:ln>
+            <a:solidFill>
+              <a:schemeClr val="tx1"/>
+            </a:solidFill>
+          </a:ln>
+        </p:spPr>
+        <p:style>
+          <a:lnRef idx="2">
+            <a:schemeClr val="accent1">
+              <a:shade val="50000"/>
+            </a:schemeClr>
+          </a:lnRef>
+          <a:fillRef idx="1">
+            <a:schemeClr val="accent1"/>
+          </a:fillRef>
+          <a:effectRef idx="0">
+            <a:schemeClr val="accent1"/>
+          </a:effectRef>
+          <a:fontRef idx="minor">
+            <a:schemeClr val="lt1"/>
+          </a:fontRef>
+        </p:style>
+        <p:txBody>
+          <a:bodyPr rtlCol="0" anchor="ctr"/>
+          <a:lstStyle/>
+          <a:p>
+            <a:pPr algn="ctr"/>
+            <a:endParaRPr lang="en-GB" sz="3600" dirty="0"/>
+          </a:p>
+        </p:txBody>
+      </p:sp>
+      <p:sp>
+        <p:nvSpPr>
+          <p:cNvPr id="96" name="Rectangle 95">
+            <a:extLst>
+              <a:ext uri="{FF2B5EF4-FFF2-40B4-BE49-F238E27FC236}">
+                <a16:creationId xmlns:a16="http://schemas.microsoft.com/office/drawing/2014/main" id="{C72C48B6-1CE1-DFA4-721B-705D83C410A2}"/>
+              </a:ext>
+            </a:extLst>
+          </p:cNvPr>
+          <p:cNvSpPr/>
+          <p:nvPr/>
+        </p:nvSpPr>
+        <p:spPr>
+          <a:xfrm>
+            <a:off x="5892335" y="1251956"/>
+            <a:ext cx="362967" cy="197015"/>
+          </a:xfrm>
+          <a:prstGeom prst="rect">
+            <a:avLst/>
+          </a:prstGeom>
+          <a:solidFill>
+            <a:srgbClr val="D09683"/>
+          </a:solidFill>
+          <a:ln>
+            <a:solidFill>
+              <a:srgbClr val="D09683"/>
+            </a:solidFill>
+          </a:ln>
+        </p:spPr>
+        <p:style>
+          <a:lnRef idx="2">
+            <a:schemeClr val="accent1">
+              <a:shade val="50000"/>
+            </a:schemeClr>
+          </a:lnRef>
+          <a:fillRef idx="1">
+            <a:schemeClr val="accent1"/>
+          </a:fillRef>
+          <a:effectRef idx="0">
+            <a:schemeClr val="accent1"/>
+          </a:effectRef>
+          <a:fontRef idx="minor">
+            <a:schemeClr val="lt1"/>
+          </a:fontRef>
+        </p:style>
+        <p:txBody>
+          <a:bodyPr rtlCol="0" anchor="ctr"/>
+          <a:lstStyle/>
+          <a:p>
+            <a:pPr algn="ctr"/>
+            <a:endParaRPr lang="en-GB" sz="3600" dirty="0"/>
+          </a:p>
+        </p:txBody>
+      </p:sp>
+      <p:sp>
+        <p:nvSpPr>
+          <p:cNvPr id="97" name="Rectangle 96">
+            <a:extLst>
+              <a:ext uri="{FF2B5EF4-FFF2-40B4-BE49-F238E27FC236}">
+                <a16:creationId xmlns:a16="http://schemas.microsoft.com/office/drawing/2014/main" id="{830FBADA-18B3-AF53-D4AD-4DDB95542D22}"/>
+              </a:ext>
+            </a:extLst>
+          </p:cNvPr>
+          <p:cNvSpPr/>
+          <p:nvPr/>
+        </p:nvSpPr>
+        <p:spPr>
+          <a:xfrm>
+            <a:off x="7320206" y="484609"/>
+            <a:ext cx="362967" cy="79200"/>
+          </a:xfrm>
+          <a:prstGeom prst="rect">
+            <a:avLst/>
+          </a:prstGeom>
+          <a:solidFill>
+            <a:schemeClr val="tx1"/>
+          </a:solidFill>
+          <a:ln>
+            <a:solidFill>
+              <a:schemeClr val="tx1"/>
+            </a:solidFill>
+          </a:ln>
+        </p:spPr>
+        <p:style>
+          <a:lnRef idx="2">
+            <a:schemeClr val="accent1">
+              <a:shade val="50000"/>
+            </a:schemeClr>
+          </a:lnRef>
+          <a:fillRef idx="1">
+            <a:schemeClr val="accent1"/>
+          </a:fillRef>
+          <a:effectRef idx="0">
+            <a:schemeClr val="accent1"/>
+          </a:effectRef>
+          <a:fontRef idx="minor">
+            <a:schemeClr val="lt1"/>
+          </a:fontRef>
+        </p:style>
+        <p:txBody>
+          <a:bodyPr rtlCol="0" anchor="ctr"/>
+          <a:lstStyle/>
+          <a:p>
+            <a:pPr algn="ctr"/>
+            <a:endParaRPr lang="en-GB" sz="3600" dirty="0"/>
+          </a:p>
+        </p:txBody>
+      </p:sp>
+      <p:sp>
+        <p:nvSpPr>
+          <p:cNvPr id="98" name="Rectangle 97">
+            <a:extLst>
+              <a:ext uri="{FF2B5EF4-FFF2-40B4-BE49-F238E27FC236}">
+                <a16:creationId xmlns:a16="http://schemas.microsoft.com/office/drawing/2014/main" id="{6C528A1F-0D89-57E1-97FC-350B1E0EC6F9}"/>
+              </a:ext>
+            </a:extLst>
+          </p:cNvPr>
+          <p:cNvSpPr/>
+          <p:nvPr/>
+        </p:nvSpPr>
+        <p:spPr>
+          <a:xfrm>
+            <a:off x="5892335" y="1448971"/>
+            <a:ext cx="362967" cy="332937"/>
+          </a:xfrm>
+          <a:prstGeom prst="rect">
+            <a:avLst/>
+          </a:prstGeom>
+          <a:solidFill>
+            <a:srgbClr val="F34A4A"/>
+          </a:solidFill>
+          <a:ln>
+            <a:solidFill>
+              <a:srgbClr val="F34A4A"/>
+            </a:solidFill>
+          </a:ln>
+        </p:spPr>
+        <p:style>
+          <a:lnRef idx="2">
+            <a:schemeClr val="accent1">
+              <a:shade val="50000"/>
+            </a:schemeClr>
+          </a:lnRef>
+          <a:fillRef idx="1">
+            <a:schemeClr val="accent1"/>
+          </a:fillRef>
+          <a:effectRef idx="0">
+            <a:schemeClr val="accent1"/>
+          </a:effectRef>
+          <a:fontRef idx="minor">
+            <a:schemeClr val="lt1"/>
+          </a:fontRef>
+        </p:style>
+        <p:txBody>
+          <a:bodyPr rtlCol="0" anchor="ctr"/>
+          <a:lstStyle/>
+          <a:p>
+            <a:pPr algn="ctr"/>
+            <a:endParaRPr lang="en-GB" sz="3600" dirty="0"/>
+          </a:p>
+        </p:txBody>
+      </p:sp>
+      <p:sp>
+        <p:nvSpPr>
+          <p:cNvPr id="100" name="Rectangle 99">
+            <a:extLst>
+              <a:ext uri="{FF2B5EF4-FFF2-40B4-BE49-F238E27FC236}">
+                <a16:creationId xmlns:a16="http://schemas.microsoft.com/office/drawing/2014/main" id="{C8366808-8570-CD5B-DE75-E5034A84DF5D}"/>
+              </a:ext>
+            </a:extLst>
+          </p:cNvPr>
+          <p:cNvSpPr/>
+          <p:nvPr/>
+        </p:nvSpPr>
+        <p:spPr>
+          <a:xfrm>
+            <a:off x="5892335" y="1781908"/>
+            <a:ext cx="362967" cy="45719"/>
+          </a:xfrm>
+          <a:prstGeom prst="rect">
+            <a:avLst/>
+          </a:prstGeom>
+          <a:solidFill>
+            <a:srgbClr val="A1D6E2"/>
+          </a:solidFill>
+          <a:ln>
+            <a:solidFill>
+              <a:srgbClr val="A1D6E2"/>
+            </a:solidFill>
+          </a:ln>
+        </p:spPr>
+        <p:style>
+          <a:lnRef idx="2">
+            <a:schemeClr val="accent1">
+              <a:shade val="50000"/>
+            </a:schemeClr>
+          </a:lnRef>
+          <a:fillRef idx="1">
+            <a:schemeClr val="accent1"/>
+          </a:fillRef>
+          <a:effectRef idx="0">
+            <a:schemeClr val="accent1"/>
+          </a:effectRef>
+          <a:fontRef idx="minor">
+            <a:schemeClr val="lt1"/>
+          </a:fontRef>
+        </p:style>
+        <p:txBody>
+          <a:bodyPr rtlCol="0" anchor="ctr"/>
+          <a:lstStyle/>
+          <a:p>
+            <a:pPr algn="ctr"/>
+            <a:endParaRPr lang="en-GB" sz="3600" dirty="0"/>
+          </a:p>
+        </p:txBody>
+      </p:sp>
+      <p:sp>
+        <p:nvSpPr>
+          <p:cNvPr id="101" name="Rectangle 100">
+            <a:extLst>
+              <a:ext uri="{FF2B5EF4-FFF2-40B4-BE49-F238E27FC236}">
+                <a16:creationId xmlns:a16="http://schemas.microsoft.com/office/drawing/2014/main" id="{463373F8-E772-5D7B-A1CB-6C4B2520B32C}"/>
+              </a:ext>
+            </a:extLst>
+          </p:cNvPr>
+          <p:cNvSpPr/>
+          <p:nvPr/>
+        </p:nvSpPr>
+        <p:spPr>
+          <a:xfrm>
+            <a:off x="5892335" y="1822938"/>
+            <a:ext cx="362967" cy="45719"/>
+          </a:xfrm>
+          <a:prstGeom prst="rect">
+            <a:avLst/>
+          </a:prstGeom>
+          <a:solidFill>
+            <a:srgbClr val="4F6457"/>
+          </a:solidFill>
+          <a:ln>
+            <a:solidFill>
+              <a:srgbClr val="4F6457"/>
+            </a:solidFill>
+          </a:ln>
+        </p:spPr>
+        <p:style>
+          <a:lnRef idx="2">
+            <a:schemeClr val="accent1">
+              <a:shade val="50000"/>
+            </a:schemeClr>
+          </a:lnRef>
+          <a:fillRef idx="1">
+            <a:schemeClr val="accent1"/>
+          </a:fillRef>
+          <a:effectRef idx="0">
+            <a:schemeClr val="accent1"/>
+          </a:effectRef>
+          <a:fontRef idx="minor">
+            <a:schemeClr val="lt1"/>
+          </a:fontRef>
+        </p:style>
+        <p:txBody>
+          <a:bodyPr rtlCol="0" anchor="ctr"/>
+          <a:lstStyle/>
+          <a:p>
+            <a:pPr algn="ctr"/>
+            <a:endParaRPr lang="en-GB" sz="3600" dirty="0"/>
+          </a:p>
+        </p:txBody>
+      </p:sp>
+      <p:sp>
+        <p:nvSpPr>
+          <p:cNvPr id="102" name="Rectangle 101">
+            <a:extLst>
+              <a:ext uri="{FF2B5EF4-FFF2-40B4-BE49-F238E27FC236}">
+                <a16:creationId xmlns:a16="http://schemas.microsoft.com/office/drawing/2014/main" id="{9F557625-8C69-719F-8518-F4467A400262}"/>
+              </a:ext>
+            </a:extLst>
+          </p:cNvPr>
+          <p:cNvSpPr/>
+          <p:nvPr/>
+        </p:nvSpPr>
+        <p:spPr>
+          <a:xfrm>
+            <a:off x="5892335" y="1870087"/>
+            <a:ext cx="362967" cy="79200"/>
+          </a:xfrm>
+          <a:prstGeom prst="rect">
+            <a:avLst/>
+          </a:prstGeom>
+          <a:solidFill>
+            <a:srgbClr val="A2BE96"/>
+          </a:solidFill>
+          <a:ln>
+            <a:solidFill>
+              <a:srgbClr val="A2BE96"/>
+            </a:solidFill>
+          </a:ln>
+        </p:spPr>
+        <p:style>
+          <a:lnRef idx="2">
+            <a:schemeClr val="accent1">
+              <a:shade val="50000"/>
+            </a:schemeClr>
+          </a:lnRef>
+          <a:fillRef idx="1">
+            <a:schemeClr val="accent1"/>
+          </a:fillRef>
+          <a:effectRef idx="0">
+            <a:schemeClr val="accent1"/>
+          </a:effectRef>
+          <a:fontRef idx="minor">
+            <a:schemeClr val="lt1"/>
+          </a:fontRef>
+        </p:style>
+        <p:txBody>
+          <a:bodyPr rtlCol="0" anchor="ctr"/>
+          <a:lstStyle/>
+          <a:p>
+            <a:pPr algn="ctr"/>
+            <a:endParaRPr lang="en-GB" sz="3600" dirty="0"/>
+          </a:p>
+        </p:txBody>
+      </p:sp>
+      <p:sp>
+        <p:nvSpPr>
+          <p:cNvPr id="103" name="Rectangle 102">
+            <a:extLst>
+              <a:ext uri="{FF2B5EF4-FFF2-40B4-BE49-F238E27FC236}">
+                <a16:creationId xmlns:a16="http://schemas.microsoft.com/office/drawing/2014/main" id="{725C9A7D-1651-D78C-218D-46D744A64C11}"/>
+              </a:ext>
+            </a:extLst>
+          </p:cNvPr>
+          <p:cNvSpPr/>
+          <p:nvPr/>
+        </p:nvSpPr>
+        <p:spPr>
+          <a:xfrm>
+            <a:off x="5892335" y="1952495"/>
+            <a:ext cx="362967" cy="79200"/>
+          </a:xfrm>
+          <a:prstGeom prst="rect">
+            <a:avLst/>
+          </a:prstGeom>
+          <a:solidFill>
+            <a:srgbClr val="4F6457"/>
+          </a:solidFill>
+          <a:ln>
+            <a:solidFill>
+              <a:srgbClr val="4F6457"/>
+            </a:solidFill>
+          </a:ln>
+        </p:spPr>
+        <p:style>
+          <a:lnRef idx="2">
+            <a:schemeClr val="accent1">
+              <a:shade val="50000"/>
+            </a:schemeClr>
+          </a:lnRef>
+          <a:fillRef idx="1">
+            <a:schemeClr val="accent1"/>
+          </a:fillRef>
+          <a:effectRef idx="0">
+            <a:schemeClr val="accent1"/>
+          </a:effectRef>
+          <a:fontRef idx="minor">
+            <a:schemeClr val="lt1"/>
+          </a:fontRef>
+        </p:style>
+        <p:txBody>
+          <a:bodyPr rtlCol="0" anchor="ctr"/>
+          <a:lstStyle/>
+          <a:p>
+            <a:pPr algn="ctr"/>
+            <a:endParaRPr lang="en-GB" sz="3600" dirty="0"/>
+          </a:p>
+        </p:txBody>
+      </p:sp>
+      <p:sp>
+        <p:nvSpPr>
+          <p:cNvPr id="104" name="Rectangle 103">
+            <a:extLst>
+              <a:ext uri="{FF2B5EF4-FFF2-40B4-BE49-F238E27FC236}">
+                <a16:creationId xmlns:a16="http://schemas.microsoft.com/office/drawing/2014/main" id="{E12D6347-4558-8FBE-82C8-5BF38E0BA082}"/>
+              </a:ext>
+            </a:extLst>
+          </p:cNvPr>
+          <p:cNvSpPr/>
+          <p:nvPr/>
+        </p:nvSpPr>
+        <p:spPr>
+          <a:xfrm>
+            <a:off x="5892335" y="2031694"/>
+            <a:ext cx="362967" cy="409913"/>
+          </a:xfrm>
+          <a:prstGeom prst="rect">
+            <a:avLst/>
+          </a:prstGeom>
+          <a:solidFill>
+            <a:srgbClr val="88A550"/>
+          </a:solidFill>
+          <a:ln>
+            <a:solidFill>
+              <a:srgbClr val="88A550"/>
+            </a:solidFill>
+          </a:ln>
+        </p:spPr>
+        <p:style>
+          <a:lnRef idx="2">
+            <a:schemeClr val="accent1">
+              <a:shade val="50000"/>
+            </a:schemeClr>
+          </a:lnRef>
+          <a:fillRef idx="1">
+            <a:schemeClr val="accent1"/>
+          </a:fillRef>
+          <a:effectRef idx="0">
+            <a:schemeClr val="accent1"/>
+          </a:effectRef>
+          <a:fontRef idx="minor">
+            <a:schemeClr val="lt1"/>
+          </a:fontRef>
+        </p:style>
+        <p:txBody>
+          <a:bodyPr rtlCol="0" anchor="ctr"/>
+          <a:lstStyle/>
+          <a:p>
+            <a:pPr algn="ctr"/>
+            <a:endParaRPr lang="en-GB" sz="3600" dirty="0"/>
+          </a:p>
+        </p:txBody>
+      </p:sp>
+      <p:sp>
+        <p:nvSpPr>
+          <p:cNvPr id="105" name="Rectangle 104">
+            <a:extLst>
+              <a:ext uri="{FF2B5EF4-FFF2-40B4-BE49-F238E27FC236}">
+                <a16:creationId xmlns:a16="http://schemas.microsoft.com/office/drawing/2014/main" id="{40E95CB4-7C6B-F9C6-50D7-C1A7A2B81D1C}"/>
+              </a:ext>
+            </a:extLst>
+          </p:cNvPr>
+          <p:cNvSpPr/>
+          <p:nvPr/>
+        </p:nvSpPr>
+        <p:spPr>
+          <a:xfrm>
+            <a:off x="5892335" y="2448257"/>
+            <a:ext cx="362967" cy="45719"/>
+          </a:xfrm>
+          <a:prstGeom prst="rect">
+            <a:avLst/>
+          </a:prstGeom>
+          <a:solidFill>
+            <a:srgbClr val="4F6457"/>
+          </a:solidFill>
+          <a:ln>
+            <a:solidFill>
+              <a:srgbClr val="4F6457"/>
+            </a:solidFill>
+          </a:ln>
+        </p:spPr>
+        <p:style>
+          <a:lnRef idx="2">
+            <a:schemeClr val="accent1">
+              <a:shade val="50000"/>
+            </a:schemeClr>
+          </a:lnRef>
+          <a:fillRef idx="1">
+            <a:schemeClr val="accent1"/>
+          </a:fillRef>
+          <a:effectRef idx="0">
+            <a:schemeClr val="accent1"/>
+          </a:effectRef>
+          <a:fontRef idx="minor">
+            <a:schemeClr val="lt1"/>
+          </a:fontRef>
+        </p:style>
+        <p:txBody>
+          <a:bodyPr rtlCol="0" anchor="ctr"/>
+          <a:lstStyle/>
+          <a:p>
+            <a:pPr algn="ctr"/>
+            <a:endParaRPr lang="en-GB" sz="3600" dirty="0"/>
+          </a:p>
+        </p:txBody>
+      </p:sp>
+      <p:sp>
+        <p:nvSpPr>
+          <p:cNvPr id="106" name="Rectangle 105">
+            <a:extLst>
+              <a:ext uri="{FF2B5EF4-FFF2-40B4-BE49-F238E27FC236}">
+                <a16:creationId xmlns:a16="http://schemas.microsoft.com/office/drawing/2014/main" id="{8BB9C885-ED23-15B7-1D0B-B673415F1E9F}"/>
+              </a:ext>
+            </a:extLst>
+          </p:cNvPr>
+          <p:cNvSpPr/>
+          <p:nvPr/>
+        </p:nvSpPr>
+        <p:spPr>
+          <a:xfrm>
+            <a:off x="5892335" y="2500626"/>
+            <a:ext cx="362967" cy="189373"/>
+          </a:xfrm>
+          <a:prstGeom prst="rect">
+            <a:avLst/>
+          </a:prstGeom>
+          <a:solidFill>
+            <a:srgbClr val="80BD9E"/>
+          </a:solidFill>
+          <a:ln>
+            <a:solidFill>
+              <a:srgbClr val="80BD9E"/>
+            </a:solidFill>
+          </a:ln>
+        </p:spPr>
+        <p:style>
+          <a:lnRef idx="2">
+            <a:schemeClr val="accent1">
+              <a:shade val="50000"/>
+            </a:schemeClr>
+          </a:lnRef>
+          <a:fillRef idx="1">
+            <a:schemeClr val="accent1"/>
+          </a:fillRef>
+          <a:effectRef idx="0">
+            <a:schemeClr val="accent1"/>
+          </a:effectRef>
+          <a:fontRef idx="minor">
+            <a:schemeClr val="lt1"/>
+          </a:fontRef>
+        </p:style>
+        <p:txBody>
+          <a:bodyPr rtlCol="0" anchor="ctr"/>
+          <a:lstStyle/>
+          <a:p>
+            <a:pPr algn="ctr"/>
+            <a:endParaRPr lang="en-GB" sz="3600" dirty="0"/>
+          </a:p>
+        </p:txBody>
+      </p:sp>
+      <p:sp>
+        <p:nvSpPr>
+          <p:cNvPr id="107" name="Rectangle 106">
+            <a:extLst>
+              <a:ext uri="{FF2B5EF4-FFF2-40B4-BE49-F238E27FC236}">
+                <a16:creationId xmlns:a16="http://schemas.microsoft.com/office/drawing/2014/main" id="{A06526DF-33BA-6D98-613B-DEA210D52EB0}"/>
+              </a:ext>
+            </a:extLst>
+          </p:cNvPr>
+          <p:cNvSpPr/>
+          <p:nvPr/>
+        </p:nvSpPr>
+        <p:spPr>
+          <a:xfrm>
+            <a:off x="5892335" y="2696649"/>
+            <a:ext cx="362967" cy="45719"/>
+          </a:xfrm>
+          <a:prstGeom prst="rect">
+            <a:avLst/>
+          </a:prstGeom>
+          <a:solidFill>
+            <a:srgbClr val="ACD1C0"/>
+          </a:solidFill>
+          <a:ln>
+            <a:solidFill>
+              <a:srgbClr val="ACD1C0"/>
+            </a:solidFill>
+          </a:ln>
+        </p:spPr>
+        <p:style>
+          <a:lnRef idx="2">
+            <a:schemeClr val="accent1">
+              <a:shade val="50000"/>
+            </a:schemeClr>
+          </a:lnRef>
+          <a:fillRef idx="1">
+            <a:schemeClr val="accent1"/>
+          </a:fillRef>
+          <a:effectRef idx="0">
+            <a:schemeClr val="accent1"/>
+          </a:effectRef>
+          <a:fontRef idx="minor">
+            <a:schemeClr val="lt1"/>
+          </a:fontRef>
+        </p:style>
+        <p:txBody>
+          <a:bodyPr rtlCol="0" anchor="ctr"/>
+          <a:lstStyle/>
+          <a:p>
+            <a:pPr algn="ctr"/>
+            <a:endParaRPr lang="en-GB" sz="3600" dirty="0"/>
+          </a:p>
+        </p:txBody>
+      </p:sp>
+      <p:sp>
+        <p:nvSpPr>
+          <p:cNvPr id="108" name="Rectangle 107">
+            <a:extLst>
+              <a:ext uri="{FF2B5EF4-FFF2-40B4-BE49-F238E27FC236}">
+                <a16:creationId xmlns:a16="http://schemas.microsoft.com/office/drawing/2014/main" id="{ADC07FA9-3407-9D91-1F23-1943410450ED}"/>
+              </a:ext>
+            </a:extLst>
+          </p:cNvPr>
+          <p:cNvSpPr/>
+          <p:nvPr/>
+        </p:nvSpPr>
+        <p:spPr>
+          <a:xfrm>
+            <a:off x="5892335" y="2751511"/>
+            <a:ext cx="362967" cy="189373"/>
+          </a:xfrm>
+          <a:prstGeom prst="rect">
+            <a:avLst/>
+          </a:prstGeom>
+          <a:solidFill>
+            <a:srgbClr val="DDBD95"/>
+          </a:solidFill>
+          <a:ln>
+            <a:solidFill>
+              <a:srgbClr val="DDBD95"/>
+            </a:solidFill>
+          </a:ln>
+        </p:spPr>
+        <p:style>
+          <a:lnRef idx="2">
+            <a:schemeClr val="accent1">
+              <a:shade val="50000"/>
+            </a:schemeClr>
+          </a:lnRef>
+          <a:fillRef idx="1">
+            <a:schemeClr val="accent1"/>
+          </a:fillRef>
+          <a:effectRef idx="0">
+            <a:schemeClr val="accent1"/>
+          </a:effectRef>
+          <a:fontRef idx="minor">
+            <a:schemeClr val="lt1"/>
+          </a:fontRef>
+        </p:style>
+        <p:txBody>
+          <a:bodyPr rtlCol="0" anchor="ctr"/>
+          <a:lstStyle/>
+          <a:p>
+            <a:pPr algn="ctr"/>
+            <a:endParaRPr lang="en-GB" sz="3600" dirty="0"/>
+          </a:p>
+        </p:txBody>
+      </p:sp>
+      <p:sp>
+        <p:nvSpPr>
+          <p:cNvPr id="109" name="Rectangle 108">
+            <a:extLst>
+              <a:ext uri="{FF2B5EF4-FFF2-40B4-BE49-F238E27FC236}">
+                <a16:creationId xmlns:a16="http://schemas.microsoft.com/office/drawing/2014/main" id="{4FF7FFC8-A7D1-3E70-AC56-532BF60905F8}"/>
+              </a:ext>
+            </a:extLst>
+          </p:cNvPr>
+          <p:cNvSpPr/>
+          <p:nvPr/>
+        </p:nvSpPr>
+        <p:spPr>
+          <a:xfrm>
+            <a:off x="5892335" y="2943377"/>
+            <a:ext cx="362967" cy="45719"/>
+          </a:xfrm>
+          <a:prstGeom prst="rect">
+            <a:avLst/>
+          </a:prstGeom>
+          <a:solidFill>
+            <a:srgbClr val="4F6457"/>
+          </a:solidFill>
+          <a:ln>
+            <a:solidFill>
+              <a:srgbClr val="4F6457"/>
+            </a:solidFill>
+          </a:ln>
+        </p:spPr>
+        <p:style>
+          <a:lnRef idx="2">
+            <a:schemeClr val="accent1">
+              <a:shade val="50000"/>
+            </a:schemeClr>
+          </a:lnRef>
+          <a:fillRef idx="1">
+            <a:schemeClr val="accent1"/>
+          </a:fillRef>
+          <a:effectRef idx="0">
+            <a:schemeClr val="accent1"/>
+          </a:effectRef>
+          <a:fontRef idx="minor">
+            <a:schemeClr val="lt1"/>
+          </a:fontRef>
+        </p:style>
+        <p:txBody>
+          <a:bodyPr rtlCol="0" anchor="ctr"/>
+          <a:lstStyle/>
+          <a:p>
+            <a:pPr algn="ctr"/>
+            <a:endParaRPr lang="en-GB" sz="3600" dirty="0"/>
+          </a:p>
+        </p:txBody>
+      </p:sp>
+      <p:sp>
+        <p:nvSpPr>
+          <p:cNvPr id="110" name="Rectangle 109">
+            <a:extLst>
+              <a:ext uri="{FF2B5EF4-FFF2-40B4-BE49-F238E27FC236}">
+                <a16:creationId xmlns:a16="http://schemas.microsoft.com/office/drawing/2014/main" id="{F7443B92-EAA7-5282-9CFD-FAD2C38C7269}"/>
+              </a:ext>
+            </a:extLst>
+          </p:cNvPr>
+          <p:cNvSpPr/>
+          <p:nvPr/>
+        </p:nvSpPr>
+        <p:spPr>
+          <a:xfrm>
+            <a:off x="5892335" y="2982446"/>
+            <a:ext cx="362967" cy="45719"/>
+          </a:xfrm>
+          <a:prstGeom prst="rect">
+            <a:avLst/>
+          </a:prstGeom>
+          <a:solidFill>
+            <a:srgbClr val="A3A599"/>
+          </a:solidFill>
+          <a:ln>
+            <a:solidFill>
+              <a:srgbClr val="A3A599"/>
+            </a:solidFill>
+          </a:ln>
+        </p:spPr>
+        <p:style>
+          <a:lnRef idx="2">
+            <a:schemeClr val="accent1">
+              <a:shade val="50000"/>
+            </a:schemeClr>
+          </a:lnRef>
+          <a:fillRef idx="1">
+            <a:schemeClr val="accent1"/>
+          </a:fillRef>
+          <a:effectRef idx="0">
+            <a:schemeClr val="accent1"/>
+          </a:effectRef>
+          <a:fontRef idx="minor">
+            <a:schemeClr val="lt1"/>
+          </a:fontRef>
+        </p:style>
+        <p:txBody>
+          <a:bodyPr rtlCol="0" anchor="ctr"/>
+          <a:lstStyle/>
+          <a:p>
+            <a:pPr algn="ctr"/>
+            <a:endParaRPr lang="en-GB" sz="3600" dirty="0"/>
+          </a:p>
+        </p:txBody>
+      </p:sp>
+      <p:sp>
+        <p:nvSpPr>
+          <p:cNvPr id="111" name="Rectangle 110">
+            <a:extLst>
+              <a:ext uri="{FF2B5EF4-FFF2-40B4-BE49-F238E27FC236}">
+                <a16:creationId xmlns:a16="http://schemas.microsoft.com/office/drawing/2014/main" id="{8F2B79F2-ADA5-181A-CF4E-99B479F5AE24}"/>
+              </a:ext>
+            </a:extLst>
+          </p:cNvPr>
+          <p:cNvSpPr/>
+          <p:nvPr/>
+        </p:nvSpPr>
+        <p:spPr>
+          <a:xfrm>
+            <a:off x="5892335" y="3021515"/>
+            <a:ext cx="362967" cy="84120"/>
+          </a:xfrm>
+          <a:prstGeom prst="rect">
+            <a:avLst/>
+          </a:prstGeom>
+          <a:solidFill>
+            <a:srgbClr val="CB1A00"/>
+          </a:solidFill>
+          <a:ln>
+            <a:solidFill>
+              <a:srgbClr val="CB1A00"/>
+            </a:solidFill>
+          </a:ln>
+        </p:spPr>
+        <p:style>
+          <a:lnRef idx="2">
+            <a:schemeClr val="accent1">
+              <a:shade val="50000"/>
+            </a:schemeClr>
+          </a:lnRef>
+          <a:fillRef idx="1">
+            <a:schemeClr val="accent1"/>
+          </a:fillRef>
+          <a:effectRef idx="0">
+            <a:schemeClr val="accent1"/>
+          </a:effectRef>
+          <a:fontRef idx="minor">
+            <a:schemeClr val="lt1"/>
+          </a:fontRef>
+        </p:style>
+        <p:txBody>
+          <a:bodyPr rtlCol="0" anchor="ctr"/>
+          <a:lstStyle/>
+          <a:p>
+            <a:pPr algn="ctr"/>
+            <a:endParaRPr lang="en-GB" sz="3600" dirty="0"/>
+          </a:p>
+        </p:txBody>
+      </p:sp>
+      <p:sp>
+        <p:nvSpPr>
+          <p:cNvPr id="112" name="Rectangle 111">
+            <a:extLst>
+              <a:ext uri="{FF2B5EF4-FFF2-40B4-BE49-F238E27FC236}">
+                <a16:creationId xmlns:a16="http://schemas.microsoft.com/office/drawing/2014/main" id="{7F673A8C-7002-0FD7-BF01-C8A117F22461}"/>
+              </a:ext>
+            </a:extLst>
+          </p:cNvPr>
+          <p:cNvSpPr/>
+          <p:nvPr/>
+        </p:nvSpPr>
+        <p:spPr>
+          <a:xfrm>
+            <a:off x="5892335" y="3105635"/>
+            <a:ext cx="362967" cy="289283"/>
+          </a:xfrm>
+          <a:prstGeom prst="rect">
+            <a:avLst/>
+          </a:prstGeom>
+          <a:solidFill>
+            <a:srgbClr val="F72900"/>
+          </a:solidFill>
+          <a:ln>
+            <a:solidFill>
+              <a:srgbClr val="F72900"/>
+            </a:solidFill>
+          </a:ln>
+        </p:spPr>
+        <p:style>
+          <a:lnRef idx="2">
+            <a:schemeClr val="accent1">
+              <a:shade val="50000"/>
+            </a:schemeClr>
+          </a:lnRef>
+          <a:fillRef idx="1">
+            <a:schemeClr val="accent1"/>
+          </a:fillRef>
+          <a:effectRef idx="0">
+            <a:schemeClr val="accent1"/>
+          </a:effectRef>
+          <a:fontRef idx="minor">
+            <a:schemeClr val="lt1"/>
+          </a:fontRef>
+        </p:style>
+        <p:txBody>
+          <a:bodyPr rtlCol="0" anchor="ctr"/>
+          <a:lstStyle/>
+          <a:p>
+            <a:pPr algn="ctr"/>
+            <a:endParaRPr lang="en-GB" sz="3600" dirty="0"/>
+          </a:p>
+        </p:txBody>
+      </p:sp>
+      <p:sp>
+        <p:nvSpPr>
+          <p:cNvPr id="113" name="Rectangle 112">
+            <a:extLst>
+              <a:ext uri="{FF2B5EF4-FFF2-40B4-BE49-F238E27FC236}">
+                <a16:creationId xmlns:a16="http://schemas.microsoft.com/office/drawing/2014/main" id="{000A7D50-75CB-240A-05D6-B4B2F15D55E7}"/>
+              </a:ext>
+            </a:extLst>
+          </p:cNvPr>
+          <p:cNvSpPr/>
+          <p:nvPr/>
+        </p:nvSpPr>
+        <p:spPr>
+          <a:xfrm>
+            <a:off x="5892335" y="3402667"/>
+            <a:ext cx="362967" cy="1353483"/>
+          </a:xfrm>
+          <a:prstGeom prst="rect">
+            <a:avLst/>
+          </a:prstGeom>
+          <a:solidFill>
+            <a:srgbClr val="375D97"/>
+          </a:solidFill>
+          <a:ln>
+            <a:solidFill>
+              <a:srgbClr val="375D97"/>
+            </a:solidFill>
+          </a:ln>
+        </p:spPr>
+        <p:style>
+          <a:lnRef idx="2">
+            <a:schemeClr val="accent1">
+              <a:shade val="50000"/>
+            </a:schemeClr>
+          </a:lnRef>
+          <a:fillRef idx="1">
+            <a:schemeClr val="accent1"/>
+          </a:fillRef>
+          <a:effectRef idx="0">
+            <a:schemeClr val="accent1"/>
+          </a:effectRef>
+          <a:fontRef idx="minor">
+            <a:schemeClr val="lt1"/>
+          </a:fontRef>
+        </p:style>
+        <p:txBody>
+          <a:bodyPr rtlCol="0" anchor="ctr"/>
+          <a:lstStyle/>
+          <a:p>
+            <a:pPr algn="ctr"/>
+            <a:endParaRPr lang="en-GB" sz="3600" dirty="0"/>
+          </a:p>
+        </p:txBody>
+      </p:sp>
+      <p:sp>
+        <p:nvSpPr>
+          <p:cNvPr id="114" name="Rectangle 113">
+            <a:extLst>
+              <a:ext uri="{FF2B5EF4-FFF2-40B4-BE49-F238E27FC236}">
+                <a16:creationId xmlns:a16="http://schemas.microsoft.com/office/drawing/2014/main" id="{26D1560F-3E6A-E366-1EFB-29E4CADF61B3}"/>
+              </a:ext>
+            </a:extLst>
+          </p:cNvPr>
+          <p:cNvSpPr/>
+          <p:nvPr/>
+        </p:nvSpPr>
+        <p:spPr>
+          <a:xfrm>
+            <a:off x="5892335" y="4763899"/>
+            <a:ext cx="362967" cy="116076"/>
+          </a:xfrm>
+          <a:prstGeom prst="rect">
+            <a:avLst/>
+          </a:prstGeom>
+          <a:solidFill>
+            <a:srgbClr val="4F6457"/>
+          </a:solidFill>
+          <a:ln>
+            <a:solidFill>
+              <a:srgbClr val="4F6457"/>
+            </a:solidFill>
+          </a:ln>
+        </p:spPr>
+        <p:style>
+          <a:lnRef idx="2">
+            <a:schemeClr val="accent1">
+              <a:shade val="50000"/>
+            </a:schemeClr>
+          </a:lnRef>
+          <a:fillRef idx="1">
+            <a:schemeClr val="accent1"/>
+          </a:fillRef>
+          <a:effectRef idx="0">
+            <a:schemeClr val="accent1"/>
+          </a:effectRef>
+          <a:fontRef idx="minor">
+            <a:schemeClr val="lt1"/>
+          </a:fontRef>
+        </p:style>
+        <p:txBody>
+          <a:bodyPr rtlCol="0" anchor="ctr"/>
+          <a:lstStyle/>
+          <a:p>
+            <a:pPr algn="ctr"/>
+            <a:endParaRPr lang="en-GB" sz="3600" dirty="0"/>
+          </a:p>
+        </p:txBody>
+      </p:sp>
+      <p:sp>
+        <p:nvSpPr>
+          <p:cNvPr id="115" name="Rectangle 114">
+            <a:extLst>
+              <a:ext uri="{FF2B5EF4-FFF2-40B4-BE49-F238E27FC236}">
+                <a16:creationId xmlns:a16="http://schemas.microsoft.com/office/drawing/2014/main" id="{2B2171C3-B5C5-4E77-91F1-12283CBD6E2F}"/>
+              </a:ext>
+            </a:extLst>
+          </p:cNvPr>
+          <p:cNvSpPr/>
+          <p:nvPr/>
+        </p:nvSpPr>
+        <p:spPr>
+          <a:xfrm>
+            <a:off x="5892335" y="4881374"/>
+            <a:ext cx="362967" cy="45719"/>
+          </a:xfrm>
+          <a:prstGeom prst="rect">
+            <a:avLst/>
+          </a:prstGeom>
+          <a:solidFill>
+            <a:srgbClr val="5D525F"/>
+          </a:solidFill>
+          <a:ln>
+            <a:solidFill>
+              <a:srgbClr val="5D525F"/>
+            </a:solidFill>
+          </a:ln>
+        </p:spPr>
+        <p:style>
+          <a:lnRef idx="2">
+            <a:schemeClr val="accent1">
+              <a:shade val="50000"/>
+            </a:schemeClr>
+          </a:lnRef>
+          <a:fillRef idx="1">
+            <a:schemeClr val="accent1"/>
+          </a:fillRef>
+          <a:effectRef idx="0">
+            <a:schemeClr val="accent1"/>
+          </a:effectRef>
+          <a:fontRef idx="minor">
+            <a:schemeClr val="lt1"/>
+          </a:fontRef>
+        </p:style>
+        <p:txBody>
+          <a:bodyPr rtlCol="0" anchor="ctr"/>
+          <a:lstStyle/>
+          <a:p>
+            <a:pPr algn="ctr"/>
+            <a:endParaRPr lang="en-GB" sz="3600" dirty="0"/>
+          </a:p>
+        </p:txBody>
+      </p:sp>
+      <p:sp>
+        <p:nvSpPr>
+          <p:cNvPr id="116" name="Rectangle 115">
+            <a:extLst>
+              <a:ext uri="{FF2B5EF4-FFF2-40B4-BE49-F238E27FC236}">
+                <a16:creationId xmlns:a16="http://schemas.microsoft.com/office/drawing/2014/main" id="{F20AF709-76F3-5E19-B519-5C4BC74FD57B}"/>
+              </a:ext>
+            </a:extLst>
+          </p:cNvPr>
+          <p:cNvSpPr/>
+          <p:nvPr/>
+        </p:nvSpPr>
+        <p:spPr>
+          <a:xfrm>
+            <a:off x="5892334" y="4927092"/>
+            <a:ext cx="362967" cy="197015"/>
+          </a:xfrm>
+          <a:prstGeom prst="rect">
+            <a:avLst/>
+          </a:prstGeom>
+          <a:solidFill>
+            <a:srgbClr val="258138"/>
+          </a:solidFill>
+          <a:ln>
+            <a:solidFill>
+              <a:srgbClr val="258138"/>
+            </a:solidFill>
+          </a:ln>
+        </p:spPr>
+        <p:style>
+          <a:lnRef idx="2">
+            <a:schemeClr val="accent1">
+              <a:shade val="50000"/>
+            </a:schemeClr>
+          </a:lnRef>
+          <a:fillRef idx="1">
+            <a:schemeClr val="accent1"/>
+          </a:fillRef>
+          <a:effectRef idx="0">
+            <a:schemeClr val="accent1"/>
+          </a:effectRef>
+          <a:fontRef idx="minor">
+            <a:schemeClr val="lt1"/>
+          </a:fontRef>
+        </p:style>
+        <p:txBody>
+          <a:bodyPr rtlCol="0" anchor="ctr"/>
+          <a:lstStyle/>
+          <a:p>
+            <a:pPr algn="ctr"/>
+            <a:endParaRPr lang="en-GB" sz="3600" dirty="0"/>
+          </a:p>
+        </p:txBody>
+      </p:sp>
+      <p:sp>
+        <p:nvSpPr>
+          <p:cNvPr id="117" name="Rectangle 116">
+            <a:extLst>
+              <a:ext uri="{FF2B5EF4-FFF2-40B4-BE49-F238E27FC236}">
+                <a16:creationId xmlns:a16="http://schemas.microsoft.com/office/drawing/2014/main" id="{91ECD8BA-0470-1C9E-F718-FDB6465C3F90}"/>
+              </a:ext>
+            </a:extLst>
+          </p:cNvPr>
+          <p:cNvSpPr/>
+          <p:nvPr/>
+        </p:nvSpPr>
+        <p:spPr>
+          <a:xfrm>
+            <a:off x="5892334" y="5125607"/>
+            <a:ext cx="362967" cy="124897"/>
+          </a:xfrm>
+          <a:prstGeom prst="rect">
+            <a:avLst/>
+          </a:prstGeom>
+          <a:solidFill>
+            <a:srgbClr val="E0E166"/>
+          </a:solidFill>
+          <a:ln>
+            <a:solidFill>
+              <a:srgbClr val="E0E166"/>
+            </a:solidFill>
+          </a:ln>
+        </p:spPr>
+        <p:style>
+          <a:lnRef idx="2">
+            <a:schemeClr val="accent1">
+              <a:shade val="50000"/>
+            </a:schemeClr>
+          </a:lnRef>
+          <a:fillRef idx="1">
+            <a:schemeClr val="accent1"/>
+          </a:fillRef>
+          <a:effectRef idx="0">
+            <a:schemeClr val="accent1"/>
+          </a:effectRef>
+          <a:fontRef idx="minor">
+            <a:schemeClr val="lt1"/>
+          </a:fontRef>
+        </p:style>
+        <p:txBody>
+          <a:bodyPr rtlCol="0" anchor="ctr"/>
+          <a:lstStyle/>
+          <a:p>
+            <a:pPr algn="ctr"/>
+            <a:endParaRPr lang="en-GB" sz="3600" dirty="0"/>
+          </a:p>
+        </p:txBody>
+      </p:sp>
+      <p:sp>
+        <p:nvSpPr>
+          <p:cNvPr id="118" name="Rectangle 117">
+            <a:extLst>
+              <a:ext uri="{FF2B5EF4-FFF2-40B4-BE49-F238E27FC236}">
+                <a16:creationId xmlns:a16="http://schemas.microsoft.com/office/drawing/2014/main" id="{4D4E67E3-3160-A42F-536B-695E7D3779DD}"/>
+              </a:ext>
+            </a:extLst>
+          </p:cNvPr>
+          <p:cNvSpPr/>
+          <p:nvPr/>
+        </p:nvSpPr>
+        <p:spPr>
+          <a:xfrm>
+            <a:off x="5892334" y="5252206"/>
+            <a:ext cx="362967" cy="245494"/>
+          </a:xfrm>
+          <a:prstGeom prst="rect">
+            <a:avLst/>
+          </a:prstGeom>
+          <a:solidFill>
+            <a:srgbClr val="4F6457"/>
+          </a:solidFill>
+          <a:ln>
+            <a:solidFill>
+              <a:srgbClr val="4F6457"/>
+            </a:solidFill>
+          </a:ln>
+        </p:spPr>
+        <p:style>
+          <a:lnRef idx="2">
+            <a:schemeClr val="accent1">
+              <a:shade val="50000"/>
+            </a:schemeClr>
+          </a:lnRef>
+          <a:fillRef idx="1">
+            <a:schemeClr val="accent1"/>
+          </a:fillRef>
+          <a:effectRef idx="0">
+            <a:schemeClr val="accent1"/>
+          </a:effectRef>
+          <a:fontRef idx="minor">
+            <a:schemeClr val="lt1"/>
+          </a:fontRef>
+        </p:style>
+        <p:txBody>
+          <a:bodyPr rtlCol="0" anchor="ctr"/>
+          <a:lstStyle/>
+          <a:p>
+            <a:pPr algn="ctr"/>
+            <a:endParaRPr lang="en-GB" sz="3600" dirty="0"/>
+          </a:p>
+        </p:txBody>
+      </p:sp>
+      <p:sp>
+        <p:nvSpPr>
+          <p:cNvPr id="119" name="Rectangle 118">
+            <a:extLst>
+              <a:ext uri="{FF2B5EF4-FFF2-40B4-BE49-F238E27FC236}">
+                <a16:creationId xmlns:a16="http://schemas.microsoft.com/office/drawing/2014/main" id="{28C6F5D6-85CD-8BA7-1195-A0D316314A88}"/>
+              </a:ext>
+            </a:extLst>
+          </p:cNvPr>
+          <p:cNvSpPr/>
+          <p:nvPr/>
+        </p:nvSpPr>
+        <p:spPr>
+          <a:xfrm>
+            <a:off x="5892334" y="5509816"/>
+            <a:ext cx="362967" cy="241717"/>
+          </a:xfrm>
+          <a:prstGeom prst="rect">
+            <a:avLst/>
+          </a:prstGeom>
+          <a:solidFill>
+            <a:srgbClr val="9B4F0E"/>
+          </a:solidFill>
+          <a:ln>
+            <a:solidFill>
+              <a:srgbClr val="9B4F0E"/>
+            </a:solidFill>
+          </a:ln>
+        </p:spPr>
+        <p:style>
+          <a:lnRef idx="2">
+            <a:schemeClr val="accent1">
+              <a:shade val="50000"/>
+            </a:schemeClr>
+          </a:lnRef>
+          <a:fillRef idx="1">
+            <a:schemeClr val="accent1"/>
+          </a:fillRef>
+          <a:effectRef idx="0">
+            <a:schemeClr val="accent1"/>
+          </a:effectRef>
+          <a:fontRef idx="minor">
+            <a:schemeClr val="lt1"/>
+          </a:fontRef>
+        </p:style>
+        <p:txBody>
+          <a:bodyPr rtlCol="0" anchor="ctr"/>
+          <a:lstStyle/>
+          <a:p>
+            <a:pPr algn="ctr"/>
+            <a:endParaRPr lang="en-GB" sz="3600" dirty="0"/>
+          </a:p>
+        </p:txBody>
+      </p:sp>
+      <p:sp>
+        <p:nvSpPr>
+          <p:cNvPr id="120" name="Rectangle 119">
+            <a:extLst>
+              <a:ext uri="{FF2B5EF4-FFF2-40B4-BE49-F238E27FC236}">
+                <a16:creationId xmlns:a16="http://schemas.microsoft.com/office/drawing/2014/main" id="{EEA3CC3E-92E1-A636-92ED-5603873BF5FD}"/>
+              </a:ext>
+            </a:extLst>
+          </p:cNvPr>
+          <p:cNvSpPr/>
+          <p:nvPr/>
+        </p:nvSpPr>
+        <p:spPr>
+          <a:xfrm>
+            <a:off x="5892334" y="5749495"/>
+            <a:ext cx="362967" cy="169194"/>
+          </a:xfrm>
+          <a:prstGeom prst="rect">
+            <a:avLst/>
+          </a:prstGeom>
+          <a:solidFill>
+            <a:srgbClr val="4F6457"/>
+          </a:solidFill>
+          <a:ln>
+            <a:solidFill>
+              <a:srgbClr val="4F6457"/>
+            </a:solidFill>
+          </a:ln>
+        </p:spPr>
+        <p:style>
+          <a:lnRef idx="2">
+            <a:schemeClr val="accent1">
+              <a:shade val="50000"/>
+            </a:schemeClr>
+          </a:lnRef>
+          <a:fillRef idx="1">
+            <a:schemeClr val="accent1"/>
+          </a:fillRef>
+          <a:effectRef idx="0">
+            <a:schemeClr val="accent1"/>
+          </a:effectRef>
+          <a:fontRef idx="minor">
+            <a:schemeClr val="lt1"/>
+          </a:fontRef>
+        </p:style>
+        <p:txBody>
+          <a:bodyPr rtlCol="0" anchor="ctr"/>
+          <a:lstStyle/>
+          <a:p>
+            <a:pPr algn="ctr"/>
+            <a:endParaRPr lang="en-GB" sz="3600" dirty="0"/>
+          </a:p>
+        </p:txBody>
+      </p:sp>
+      <p:sp>
+        <p:nvSpPr>
+          <p:cNvPr id="121" name="Rectangle 120">
+            <a:extLst>
+              <a:ext uri="{FF2B5EF4-FFF2-40B4-BE49-F238E27FC236}">
+                <a16:creationId xmlns:a16="http://schemas.microsoft.com/office/drawing/2014/main" id="{4FEB43C3-3E7D-B2FA-4A92-18DF6D091E73}"/>
+              </a:ext>
+            </a:extLst>
+          </p:cNvPr>
+          <p:cNvSpPr/>
+          <p:nvPr/>
+        </p:nvSpPr>
+        <p:spPr>
+          <a:xfrm>
+            <a:off x="5892334" y="5916849"/>
+            <a:ext cx="362967" cy="280411"/>
+          </a:xfrm>
+          <a:prstGeom prst="rect">
+            <a:avLst/>
+          </a:prstGeom>
+          <a:solidFill>
+            <a:srgbClr val="4796D9"/>
+          </a:solidFill>
+          <a:ln>
+            <a:solidFill>
+              <a:srgbClr val="4796D9"/>
+            </a:solidFill>
+          </a:ln>
+        </p:spPr>
+        <p:style>
+          <a:lnRef idx="2">
+            <a:schemeClr val="accent1">
+              <a:shade val="50000"/>
+            </a:schemeClr>
+          </a:lnRef>
+          <a:fillRef idx="1">
+            <a:schemeClr val="accent1"/>
+          </a:fillRef>
+          <a:effectRef idx="0">
+            <a:schemeClr val="accent1"/>
+          </a:effectRef>
+          <a:fontRef idx="minor">
+            <a:schemeClr val="lt1"/>
+          </a:fontRef>
+        </p:style>
+        <p:txBody>
+          <a:bodyPr rtlCol="0" anchor="ctr"/>
+          <a:lstStyle/>
+          <a:p>
+            <a:pPr algn="ctr"/>
+            <a:endParaRPr lang="en-GB" sz="3600" dirty="0"/>
+          </a:p>
+        </p:txBody>
+      </p:sp>
+      <p:sp>
+        <p:nvSpPr>
+          <p:cNvPr id="122" name="Rectangle 121">
+            <a:extLst>
+              <a:ext uri="{FF2B5EF4-FFF2-40B4-BE49-F238E27FC236}">
+                <a16:creationId xmlns:a16="http://schemas.microsoft.com/office/drawing/2014/main" id="{941EC010-C308-BF91-5AF3-D0ACB0A872AD}"/>
+              </a:ext>
+            </a:extLst>
+          </p:cNvPr>
+          <p:cNvSpPr/>
+          <p:nvPr/>
+        </p:nvSpPr>
+        <p:spPr>
+          <a:xfrm>
+            <a:off x="5892334" y="6203987"/>
+            <a:ext cx="362967" cy="82664"/>
+          </a:xfrm>
+          <a:prstGeom prst="rect">
+            <a:avLst/>
+          </a:prstGeom>
+          <a:solidFill>
+            <a:srgbClr val="76B2A9"/>
+          </a:solidFill>
+          <a:ln>
+            <a:solidFill>
+              <a:srgbClr val="76B2A9"/>
+            </a:solidFill>
+          </a:ln>
+        </p:spPr>
+        <p:style>
+          <a:lnRef idx="2">
+            <a:schemeClr val="accent1">
+              <a:shade val="50000"/>
+            </a:schemeClr>
+          </a:lnRef>
+          <a:fillRef idx="1">
+            <a:schemeClr val="accent1"/>
+          </a:fillRef>
+          <a:effectRef idx="0">
+            <a:schemeClr val="accent1"/>
+          </a:effectRef>
+          <a:fontRef idx="minor">
+            <a:schemeClr val="lt1"/>
+          </a:fontRef>
+        </p:style>
+        <p:txBody>
+          <a:bodyPr rtlCol="0" anchor="ctr"/>
+          <a:lstStyle/>
+          <a:p>
+            <a:pPr algn="ctr"/>
+            <a:endParaRPr lang="en-GB" sz="3600" dirty="0"/>
+          </a:p>
+        </p:txBody>
+      </p:sp>
+      <p:sp>
+        <p:nvSpPr>
+          <p:cNvPr id="123" name="Rectangle 122">
+            <a:extLst>
+              <a:ext uri="{FF2B5EF4-FFF2-40B4-BE49-F238E27FC236}">
+                <a16:creationId xmlns:a16="http://schemas.microsoft.com/office/drawing/2014/main" id="{4BDC1DB4-92EA-62DD-CDA8-FD33AC7C8306}"/>
+              </a:ext>
+            </a:extLst>
+          </p:cNvPr>
+          <p:cNvSpPr/>
+          <p:nvPr/>
+        </p:nvSpPr>
+        <p:spPr>
+          <a:xfrm>
+            <a:off x="5892333" y="6292762"/>
+            <a:ext cx="362967" cy="486140"/>
+          </a:xfrm>
+          <a:prstGeom prst="rect">
+            <a:avLst/>
+          </a:prstGeom>
+          <a:solidFill>
+            <a:srgbClr val="F8EFE2"/>
+          </a:solidFill>
+          <a:ln>
+            <a:solidFill>
+              <a:srgbClr val="F8EFE2"/>
+            </a:solidFill>
+          </a:ln>
+        </p:spPr>
+        <p:style>
+          <a:lnRef idx="2">
+            <a:schemeClr val="accent1">
+              <a:shade val="50000"/>
+            </a:schemeClr>
+          </a:lnRef>
+          <a:fillRef idx="1">
+            <a:schemeClr val="accent1"/>
+          </a:fillRef>
+          <a:effectRef idx="0">
+            <a:schemeClr val="accent1"/>
+          </a:effectRef>
+          <a:fontRef idx="minor">
+            <a:schemeClr val="lt1"/>
+          </a:fontRef>
+        </p:style>
+        <p:txBody>
+          <a:bodyPr rtlCol="0" anchor="ctr"/>
+          <a:lstStyle/>
+          <a:p>
+            <a:pPr algn="ctr"/>
+            <a:endParaRPr lang="en-GB" sz="3600" dirty="0"/>
+          </a:p>
+        </p:txBody>
+      </p:sp>
+      <p:sp>
+        <p:nvSpPr>
+          <p:cNvPr id="124" name="Rectangle 123">
+            <a:extLst>
+              <a:ext uri="{FF2B5EF4-FFF2-40B4-BE49-F238E27FC236}">
+                <a16:creationId xmlns:a16="http://schemas.microsoft.com/office/drawing/2014/main" id="{3B9053D6-B253-7951-AFEB-DC203798FF95}"/>
+              </a:ext>
+            </a:extLst>
+          </p:cNvPr>
+          <p:cNvSpPr/>
+          <p:nvPr/>
+        </p:nvSpPr>
+        <p:spPr>
+          <a:xfrm>
+            <a:off x="5892333" y="6772252"/>
+            <a:ext cx="362967" cy="126058"/>
+          </a:xfrm>
+          <a:prstGeom prst="rect">
+            <a:avLst/>
+          </a:prstGeom>
+          <a:solidFill>
+            <a:srgbClr val="21938B"/>
+          </a:solidFill>
+          <a:ln>
+            <a:solidFill>
+              <a:srgbClr val="21938B"/>
+            </a:solidFill>
+          </a:ln>
+        </p:spPr>
+        <p:style>
+          <a:lnRef idx="2">
+            <a:schemeClr val="accent1">
+              <a:shade val="50000"/>
+            </a:schemeClr>
+          </a:lnRef>
+          <a:fillRef idx="1">
+            <a:schemeClr val="accent1"/>
+          </a:fillRef>
+          <a:effectRef idx="0">
+            <a:schemeClr val="accent1"/>
+          </a:effectRef>
+          <a:fontRef idx="minor">
+            <a:schemeClr val="lt1"/>
+          </a:fontRef>
+        </p:style>
+        <p:txBody>
+          <a:bodyPr rtlCol="0" anchor="ctr"/>
+          <a:lstStyle/>
+          <a:p>
+            <a:pPr algn="ctr"/>
+            <a:endParaRPr lang="en-GB" sz="3600" dirty="0"/>
+          </a:p>
+        </p:txBody>
+      </p:sp>
+      <p:sp>
+        <p:nvSpPr>
+          <p:cNvPr id="125" name="Rectangle 124">
+            <a:extLst>
+              <a:ext uri="{FF2B5EF4-FFF2-40B4-BE49-F238E27FC236}">
+                <a16:creationId xmlns:a16="http://schemas.microsoft.com/office/drawing/2014/main" id="{8C173935-F698-7F17-75E2-6CA3AD73AE32}"/>
+              </a:ext>
+            </a:extLst>
+          </p:cNvPr>
+          <p:cNvSpPr/>
+          <p:nvPr/>
+        </p:nvSpPr>
+        <p:spPr>
+          <a:xfrm>
+            <a:off x="5892333" y="6898310"/>
+            <a:ext cx="362967" cy="82600"/>
+          </a:xfrm>
+          <a:prstGeom prst="rect">
+            <a:avLst/>
+          </a:prstGeom>
+          <a:solidFill>
+            <a:srgbClr val="1795AD"/>
+          </a:solidFill>
+          <a:ln>
+            <a:solidFill>
+              <a:srgbClr val="1795AD"/>
+            </a:solidFill>
+          </a:ln>
+        </p:spPr>
+        <p:style>
+          <a:lnRef idx="2">
+            <a:schemeClr val="accent1">
+              <a:shade val="50000"/>
+            </a:schemeClr>
+          </a:lnRef>
+          <a:fillRef idx="1">
+            <a:schemeClr val="accent1"/>
+          </a:fillRef>
+          <a:effectRef idx="0">
+            <a:schemeClr val="accent1"/>
+          </a:effectRef>
+          <a:fontRef idx="minor">
+            <a:schemeClr val="lt1"/>
+          </a:fontRef>
+        </p:style>
+        <p:txBody>
+          <a:bodyPr rtlCol="0" anchor="ctr"/>
+          <a:lstStyle/>
+          <a:p>
+            <a:pPr algn="ctr"/>
+            <a:endParaRPr lang="en-GB" sz="3600" dirty="0"/>
+          </a:p>
+        </p:txBody>
+      </p:sp>
+      <p:sp>
+        <p:nvSpPr>
+          <p:cNvPr id="126" name="Rectangle 125">
+            <a:extLst>
+              <a:ext uri="{FF2B5EF4-FFF2-40B4-BE49-F238E27FC236}">
+                <a16:creationId xmlns:a16="http://schemas.microsoft.com/office/drawing/2014/main" id="{DFD3F5AE-0182-30D5-6F83-9BD59A0B66D0}"/>
+              </a:ext>
+            </a:extLst>
+          </p:cNvPr>
+          <p:cNvSpPr/>
+          <p:nvPr/>
+        </p:nvSpPr>
+        <p:spPr>
+          <a:xfrm>
+            <a:off x="5892333" y="6986692"/>
+            <a:ext cx="362967" cy="120940"/>
+          </a:xfrm>
+          <a:prstGeom prst="rect">
+            <a:avLst/>
+          </a:prstGeom>
+          <a:solidFill>
+            <a:srgbClr val="D8B549"/>
+          </a:solidFill>
+          <a:ln>
+            <a:solidFill>
+              <a:srgbClr val="D8B549"/>
+            </a:solidFill>
+          </a:ln>
+        </p:spPr>
+        <p:style>
+          <a:lnRef idx="2">
+            <a:schemeClr val="accent1">
+              <a:shade val="50000"/>
+            </a:schemeClr>
+          </a:lnRef>
+          <a:fillRef idx="1">
+            <a:schemeClr val="accent1"/>
+          </a:fillRef>
+          <a:effectRef idx="0">
+            <a:schemeClr val="accent1"/>
+          </a:effectRef>
+          <a:fontRef idx="minor">
+            <a:schemeClr val="lt1"/>
+          </a:fontRef>
+        </p:style>
+        <p:txBody>
+          <a:bodyPr rtlCol="0" anchor="ctr"/>
+          <a:lstStyle/>
+          <a:p>
+            <a:pPr algn="ctr"/>
+            <a:endParaRPr lang="en-GB" sz="3600" dirty="0"/>
+          </a:p>
+        </p:txBody>
+      </p:sp>
+      <p:sp>
+        <p:nvSpPr>
+          <p:cNvPr id="127" name="Rectangle 126">
+            <a:extLst>
+              <a:ext uri="{FF2B5EF4-FFF2-40B4-BE49-F238E27FC236}">
+                <a16:creationId xmlns:a16="http://schemas.microsoft.com/office/drawing/2014/main" id="{8FA7B14D-422F-BFEE-CACF-4E7F8AC4E1D4}"/>
+              </a:ext>
+            </a:extLst>
+          </p:cNvPr>
+          <p:cNvSpPr/>
+          <p:nvPr/>
+        </p:nvSpPr>
+        <p:spPr>
+          <a:xfrm>
+            <a:off x="5892333" y="7117453"/>
+            <a:ext cx="362967" cy="1105475"/>
+          </a:xfrm>
+          <a:prstGeom prst="rect">
+            <a:avLst/>
+          </a:prstGeom>
+          <a:solidFill>
+            <a:srgbClr val="A3A599"/>
+          </a:solidFill>
+          <a:ln>
+            <a:solidFill>
+              <a:srgbClr val="A3A599"/>
+            </a:solidFill>
+          </a:ln>
+        </p:spPr>
+        <p:style>
+          <a:lnRef idx="2">
+            <a:schemeClr val="accent1">
+              <a:shade val="50000"/>
+            </a:schemeClr>
+          </a:lnRef>
+          <a:fillRef idx="1">
+            <a:schemeClr val="accent1"/>
+          </a:fillRef>
+          <a:effectRef idx="0">
+            <a:schemeClr val="accent1"/>
+          </a:effectRef>
+          <a:fontRef idx="minor">
+            <a:schemeClr val="lt1"/>
+          </a:fontRef>
+        </p:style>
+        <p:txBody>
+          <a:bodyPr rtlCol="0" anchor="ctr"/>
+          <a:lstStyle/>
+          <a:p>
+            <a:pPr algn="ctr"/>
+            <a:endParaRPr lang="en-GB" sz="3600" dirty="0"/>
+          </a:p>
+        </p:txBody>
+      </p:sp>
+      <p:sp>
+        <p:nvSpPr>
+          <p:cNvPr id="128" name="Rectangle 127">
+            <a:extLst>
+              <a:ext uri="{FF2B5EF4-FFF2-40B4-BE49-F238E27FC236}">
+                <a16:creationId xmlns:a16="http://schemas.microsoft.com/office/drawing/2014/main" id="{562C18A6-38FC-18EA-F8C8-4BA4F3918B71}"/>
+              </a:ext>
+            </a:extLst>
+          </p:cNvPr>
+          <p:cNvSpPr/>
+          <p:nvPr/>
+        </p:nvSpPr>
+        <p:spPr>
+          <a:xfrm>
+            <a:off x="5892333" y="8222928"/>
+            <a:ext cx="362967" cy="45719"/>
+          </a:xfrm>
+          <a:prstGeom prst="rect">
+            <a:avLst/>
+          </a:prstGeom>
+          <a:solidFill>
+            <a:srgbClr val="08575B"/>
+          </a:solidFill>
+          <a:ln>
+            <a:solidFill>
+              <a:srgbClr val="08575B"/>
+            </a:solidFill>
+          </a:ln>
+        </p:spPr>
+        <p:style>
+          <a:lnRef idx="2">
+            <a:schemeClr val="accent1">
+              <a:shade val="50000"/>
+            </a:schemeClr>
+          </a:lnRef>
+          <a:fillRef idx="1">
+            <a:schemeClr val="accent1"/>
+          </a:fillRef>
+          <a:effectRef idx="0">
+            <a:schemeClr val="accent1"/>
+          </a:effectRef>
+          <a:fontRef idx="minor">
+            <a:schemeClr val="lt1"/>
+          </a:fontRef>
+        </p:style>
+        <p:txBody>
+          <a:bodyPr rtlCol="0" anchor="ctr"/>
+          <a:lstStyle/>
+          <a:p>
+            <a:pPr algn="ctr"/>
+            <a:endParaRPr lang="en-GB" sz="3600" dirty="0"/>
+          </a:p>
+        </p:txBody>
+      </p:sp>
+      <p:sp>
+        <p:nvSpPr>
+          <p:cNvPr id="129" name="Rectangle 128">
+            <a:extLst>
+              <a:ext uri="{FF2B5EF4-FFF2-40B4-BE49-F238E27FC236}">
+                <a16:creationId xmlns:a16="http://schemas.microsoft.com/office/drawing/2014/main" id="{B0DF7D1F-85EE-B961-99DC-6AA416134674}"/>
+              </a:ext>
+            </a:extLst>
+          </p:cNvPr>
+          <p:cNvSpPr/>
+          <p:nvPr/>
+        </p:nvSpPr>
+        <p:spPr>
+          <a:xfrm>
+            <a:off x="5892333" y="8263980"/>
+            <a:ext cx="362967" cy="45719"/>
+          </a:xfrm>
+          <a:prstGeom prst="rect">
+            <a:avLst/>
+          </a:prstGeom>
+          <a:solidFill>
+            <a:srgbClr val="65A5AE"/>
+          </a:solidFill>
+          <a:ln>
+            <a:solidFill>
+              <a:srgbClr val="65A5AE"/>
+            </a:solidFill>
+          </a:ln>
+        </p:spPr>
+        <p:style>
+          <a:lnRef idx="2">
+            <a:schemeClr val="accent1">
+              <a:shade val="50000"/>
+            </a:schemeClr>
+          </a:lnRef>
+          <a:fillRef idx="1">
+            <a:schemeClr val="accent1"/>
+          </a:fillRef>
+          <a:effectRef idx="0">
+            <a:schemeClr val="accent1"/>
+          </a:effectRef>
+          <a:fontRef idx="minor">
+            <a:schemeClr val="lt1"/>
+          </a:fontRef>
+        </p:style>
+        <p:txBody>
+          <a:bodyPr rtlCol="0" anchor="ctr"/>
+          <a:lstStyle/>
+          <a:p>
+            <a:pPr algn="ctr"/>
+            <a:endParaRPr lang="en-GB" sz="3600" dirty="0"/>
+          </a:p>
+        </p:txBody>
+      </p:sp>
+      <p:sp>
+        <p:nvSpPr>
+          <p:cNvPr id="130" name="Rectangle 129">
+            <a:extLst>
+              <a:ext uri="{FF2B5EF4-FFF2-40B4-BE49-F238E27FC236}">
+                <a16:creationId xmlns:a16="http://schemas.microsoft.com/office/drawing/2014/main" id="{EF96C8DB-BC7E-F63E-83B7-D3E00824419A}"/>
+              </a:ext>
+            </a:extLst>
+          </p:cNvPr>
+          <p:cNvSpPr/>
+          <p:nvPr/>
+        </p:nvSpPr>
+        <p:spPr>
+          <a:xfrm>
+            <a:off x="5892333" y="8305032"/>
+            <a:ext cx="362967" cy="45719"/>
+          </a:xfrm>
+          <a:prstGeom prst="rect">
+            <a:avLst/>
+          </a:prstGeom>
+          <a:solidFill>
+            <a:srgbClr val="08575B"/>
+          </a:solidFill>
+          <a:ln>
+            <a:solidFill>
+              <a:srgbClr val="08575B"/>
+            </a:solidFill>
+          </a:ln>
+        </p:spPr>
+        <p:style>
+          <a:lnRef idx="2">
+            <a:schemeClr val="accent1">
+              <a:shade val="50000"/>
+            </a:schemeClr>
+          </a:lnRef>
+          <a:fillRef idx="1">
+            <a:schemeClr val="accent1"/>
+          </a:fillRef>
+          <a:effectRef idx="0">
+            <a:schemeClr val="accent1"/>
+          </a:effectRef>
+          <a:fontRef idx="minor">
+            <a:schemeClr val="lt1"/>
+          </a:fontRef>
+        </p:style>
+        <p:txBody>
+          <a:bodyPr rtlCol="0" anchor="ctr"/>
+          <a:lstStyle/>
+          <a:p>
+            <a:pPr algn="ctr"/>
+            <a:endParaRPr lang="en-GB" sz="3600" dirty="0"/>
+          </a:p>
+        </p:txBody>
+      </p:sp>
+      <p:sp>
+        <p:nvSpPr>
+          <p:cNvPr id="131" name="Rectangle 130">
+            <a:extLst>
+              <a:ext uri="{FF2B5EF4-FFF2-40B4-BE49-F238E27FC236}">
+                <a16:creationId xmlns:a16="http://schemas.microsoft.com/office/drawing/2014/main" id="{1AD1F679-91A9-8308-54D8-C9BA65775658}"/>
+              </a:ext>
+            </a:extLst>
+          </p:cNvPr>
+          <p:cNvSpPr/>
+          <p:nvPr/>
+        </p:nvSpPr>
+        <p:spPr>
+          <a:xfrm>
+            <a:off x="5892333" y="8346084"/>
+            <a:ext cx="362967" cy="164401"/>
+          </a:xfrm>
+          <a:prstGeom prst="rect">
+            <a:avLst/>
+          </a:prstGeom>
+          <a:solidFill>
+            <a:srgbClr val="326C87"/>
+          </a:solidFill>
+          <a:ln>
+            <a:solidFill>
+              <a:srgbClr val="326C87"/>
+            </a:solidFill>
+          </a:ln>
+        </p:spPr>
+        <p:style>
+          <a:lnRef idx="2">
+            <a:schemeClr val="accent1">
+              <a:shade val="50000"/>
+            </a:schemeClr>
+          </a:lnRef>
+          <a:fillRef idx="1">
+            <a:schemeClr val="accent1"/>
+          </a:fillRef>
+          <a:effectRef idx="0">
+            <a:schemeClr val="accent1"/>
+          </a:effectRef>
+          <a:fontRef idx="minor">
+            <a:schemeClr val="lt1"/>
+          </a:fontRef>
+        </p:style>
+        <p:txBody>
+          <a:bodyPr rtlCol="0" anchor="ctr"/>
+          <a:lstStyle/>
+          <a:p>
+            <a:pPr algn="ctr"/>
+            <a:endParaRPr lang="en-GB" sz="3600" dirty="0"/>
+          </a:p>
+        </p:txBody>
+      </p:sp>
+      <p:sp>
+        <p:nvSpPr>
+          <p:cNvPr id="132" name="Rectangle 131">
+            <a:extLst>
+              <a:ext uri="{FF2B5EF4-FFF2-40B4-BE49-F238E27FC236}">
+                <a16:creationId xmlns:a16="http://schemas.microsoft.com/office/drawing/2014/main" id="{2C073BFF-7E4A-2CF3-AB1A-69292EA0DBFB}"/>
+              </a:ext>
+            </a:extLst>
+          </p:cNvPr>
+          <p:cNvSpPr/>
+          <p:nvPr/>
+        </p:nvSpPr>
+        <p:spPr>
+          <a:xfrm>
+            <a:off x="5892333" y="8511463"/>
+            <a:ext cx="362967" cy="245655"/>
+          </a:xfrm>
+          <a:prstGeom prst="rect">
+            <a:avLst/>
+          </a:prstGeom>
+          <a:solidFill>
+            <a:srgbClr val="FA8230"/>
+          </a:solidFill>
+          <a:ln>
+            <a:solidFill>
+              <a:srgbClr val="FA8230"/>
+            </a:solidFill>
+          </a:ln>
+        </p:spPr>
+        <p:style>
+          <a:lnRef idx="2">
+            <a:schemeClr val="accent1">
+              <a:shade val="50000"/>
+            </a:schemeClr>
+          </a:lnRef>
+          <a:fillRef idx="1">
+            <a:schemeClr val="accent1"/>
+          </a:fillRef>
+          <a:effectRef idx="0">
+            <a:schemeClr val="accent1"/>
+          </a:effectRef>
+          <a:fontRef idx="minor">
+            <a:schemeClr val="lt1"/>
+          </a:fontRef>
+        </p:style>
+        <p:txBody>
+          <a:bodyPr rtlCol="0" anchor="ctr"/>
+          <a:lstStyle/>
+          <a:p>
+            <a:pPr algn="ctr"/>
+            <a:endParaRPr lang="en-GB" sz="3600" dirty="0"/>
+          </a:p>
+        </p:txBody>
+      </p:sp>
+      <p:sp>
+        <p:nvSpPr>
+          <p:cNvPr id="133" name="Rectangle 132">
+            <a:extLst>
+              <a:ext uri="{FF2B5EF4-FFF2-40B4-BE49-F238E27FC236}">
+                <a16:creationId xmlns:a16="http://schemas.microsoft.com/office/drawing/2014/main" id="{77750D4F-B73A-CF2C-635C-5100F0FC6D07}"/>
+              </a:ext>
+            </a:extLst>
+          </p:cNvPr>
+          <p:cNvSpPr/>
+          <p:nvPr/>
+        </p:nvSpPr>
+        <p:spPr>
+          <a:xfrm>
+            <a:off x="5892333" y="8768068"/>
+            <a:ext cx="362967" cy="1314499"/>
+          </a:xfrm>
+          <a:prstGeom prst="rect">
+            <a:avLst/>
+          </a:prstGeom>
+          <a:solidFill>
+            <a:srgbClr val="FBAF07"/>
+          </a:solidFill>
+          <a:ln>
+            <a:solidFill>
+              <a:srgbClr val="FBAF07"/>
+            </a:solidFill>
+          </a:ln>
+        </p:spPr>
+        <p:style>
+          <a:lnRef idx="2">
+            <a:schemeClr val="accent1">
+              <a:shade val="50000"/>
+            </a:schemeClr>
+          </a:lnRef>
+          <a:fillRef idx="1">
+            <a:schemeClr val="accent1"/>
+          </a:fillRef>
+          <a:effectRef idx="0">
+            <a:schemeClr val="accent1"/>
+          </a:effectRef>
+          <a:fontRef idx="minor">
+            <a:schemeClr val="lt1"/>
+          </a:fontRef>
+        </p:style>
+        <p:txBody>
+          <a:bodyPr rtlCol="0" anchor="ctr"/>
+          <a:lstStyle/>
+          <a:p>
+            <a:pPr algn="ctr"/>
+            <a:endParaRPr lang="en-GB" sz="3600" dirty="0"/>
+          </a:p>
+        </p:txBody>
+      </p:sp>
+    </p:spTree>
+    <p:extLst>
+      <p:ext uri="{BB962C8B-B14F-4D97-AF65-F5344CB8AC3E}">
+        <p14:creationId xmlns:p14="http://schemas.microsoft.com/office/powerpoint/2010/main" val="2754048697"/>
+      </p:ext>
+    </p:extLst>
+  </p:cSld>
+  <p:clrMapOvr>
+    <a:masterClrMapping/>
+  </p:clrMapOvr>
+</p:sld>
+</file>
+
+<file path=ppt/slides/slide3.xml><?xml version="1.0" encoding="utf-8"?>
+<p:sld xmlns:a="http://schemas.openxmlformats.org/drawingml/2006/main" xmlns:r="http://schemas.openxmlformats.org/officeDocument/2006/relationships" xmlns:p="http://schemas.openxmlformats.org/presentationml/2006/main">
+  <p:cSld>
+    <p:spTree>
+      <p:nvGrpSpPr>
+        <p:cNvPr id="1" name=""/>
+        <p:cNvGrpSpPr/>
+        <p:nvPr/>
+      </p:nvGrpSpPr>
+      <p:grpSpPr>
+        <a:xfrm>
+          <a:off x="0" y="0"/>
+          <a:ext cx="0" cy="0"/>
+          <a:chOff x="0" y="0"/>
+          <a:chExt cx="0" cy="0"/>
+        </a:xfrm>
+      </p:grpSpPr>
+      <p:pic>
+        <p:nvPicPr>
+          <p:cNvPr id="41" name="Content Placeholder 40">
+            <a:extLst>
+              <a:ext uri="{FF2B5EF4-FFF2-40B4-BE49-F238E27FC236}">
+                <a16:creationId xmlns:a16="http://schemas.microsoft.com/office/drawing/2014/main" id="{BEE70B10-6783-576A-552B-7BE9ED4501F4}"/>
+              </a:ext>
+            </a:extLst>
+          </p:cNvPr>
+          <p:cNvPicPr>
+            <a:picLocks noGrp="1" noChangeAspect="1"/>
+          </p:cNvPicPr>
           <p:nvPr>
             <p:ph idx="1"/>
           </p:nvPr>
-        </p:nvSpPr>
-        <p:spPr/>
-        <p:txBody>
-          <a:bodyPr/>
-          <a:lstStyle/>
-          <a:p>
-            <a:endParaRPr lang="en-GB"/>
-          </a:p>
-        </p:txBody>
-      </p:sp>
+        </p:nvPicPr>
+        <p:blipFill>
+          <a:blip r:embed="rId2"/>
+          <a:stretch>
+            <a:fillRect/>
+          </a:stretch>
+        </p:blipFill>
+        <p:spPr>
+          <a:xfrm>
+            <a:off x="257932" y="-825356"/>
+            <a:ext cx="8808599" cy="12450474"/>
+          </a:xfrm>
+        </p:spPr>
+      </p:pic>
       <p:grpSp>
         <p:nvGrpSpPr>
           <p:cNvPr id="4" name="Group 3">
@@ -5186,9 +7885,9 @@
           <p:nvPr/>
         </p:nvGrpSpPr>
         <p:grpSpPr>
-          <a:xfrm>
-            <a:off x="3688619" y="571500"/>
-            <a:ext cx="2432146" cy="9801225"/>
+          <a:xfrm flipH="1">
+            <a:off x="6634384" y="326173"/>
+            <a:ext cx="2598825" cy="9999856"/>
             <a:chOff x="1051009" y="1057476"/>
             <a:chExt cx="2042387" cy="8684809"/>
           </a:xfrm>
@@ -5208,7 +7907,7 @@
             <p:nvPr/>
           </p:nvPicPr>
           <p:blipFill rotWithShape="1">
-            <a:blip r:embed="rId2"/>
+            <a:blip r:embed="rId3"/>
             <a:srcRect l="11817" t="9167" r="26639" b="10417"/>
             <a:stretch/>
           </p:blipFill>
@@ -5402,7 +8101,7 @@
                 </p:nvSpPr>
                 <p:spPr>
                   <a:xfrm>
-                    <a:off x="2667203" y="1186774"/>
+                    <a:off x="2667203" y="1198399"/>
                     <a:ext cx="304800" cy="144000"/>
                   </a:xfrm>
                   <a:prstGeom prst="rect">
@@ -6971,7 +9670,7 @@
 </p:sld>
 </file>
 
-<file path=ppt/slides/slide3.xml><?xml version="1.0" encoding="utf-8"?>
+<file path=ppt/slides/slide4.xml><?xml version="1.0" encoding="utf-8"?>
 <p:sld xmlns:a="http://schemas.openxmlformats.org/drawingml/2006/main" xmlns:r="http://schemas.openxmlformats.org/officeDocument/2006/relationships" xmlns:p="http://schemas.openxmlformats.org/presentationml/2006/main">
   <p:cSld>
     <p:spTree>
@@ -7143,7 +9842,7 @@
 </p:sld>
 </file>
 
-<file path=ppt/slides/slide4.xml><?xml version="1.0" encoding="utf-8"?>
+<file path=ppt/slides/slide5.xml><?xml version="1.0" encoding="utf-8"?>
 <p:sld xmlns:a="http://schemas.openxmlformats.org/drawingml/2006/main" xmlns:r="http://schemas.openxmlformats.org/officeDocument/2006/relationships" xmlns:p="http://schemas.openxmlformats.org/presentationml/2006/main">
   <p:cSld>
     <p:spTree>
@@ -7574,4 +10273,299 @@
     </a:ext>
   </a:extLst>
 </a:theme>
+</file>
+
+<file path=ppt/theme/theme2.xml><?xml version="1.0" encoding="utf-8"?>
+<a:theme xmlns:a="http://schemas.openxmlformats.org/drawingml/2006/main" name="Office Theme 2013 - 2022">
+  <a:themeElements>
+    <a:clrScheme name="Office">
+      <a:dk1>
+        <a:sysClr val="windowText" lastClr="000000"/>
+      </a:dk1>
+      <a:lt1>
+        <a:sysClr val="window" lastClr="FFFFFF"/>
+      </a:lt1>
+      <a:dk2>
+        <a:srgbClr val="44546A"/>
+      </a:dk2>
+      <a:lt2>
+        <a:srgbClr val="E7E6E6"/>
+      </a:lt2>
+      <a:accent1>
+        <a:srgbClr val="4472C4"/>
+      </a:accent1>
+      <a:accent2>
+        <a:srgbClr val="ED7D31"/>
+      </a:accent2>
+      <a:accent3>
+        <a:srgbClr val="A5A5A5"/>
+      </a:accent3>
+      <a:accent4>
+        <a:srgbClr val="FFC000"/>
+      </a:accent4>
+      <a:accent5>
+        <a:srgbClr val="5B9BD5"/>
+      </a:accent5>
+      <a:accent6>
+        <a:srgbClr val="70AD47"/>
+      </a:accent6>
+      <a:hlink>
+        <a:srgbClr val="0563C1"/>
+      </a:hlink>
+      <a:folHlink>
+        <a:srgbClr val="954F72"/>
+      </a:folHlink>
+    </a:clrScheme>
+    <a:fontScheme name="Office">
+      <a:majorFont>
+        <a:latin typeface="Calibri Light" panose="020F0302020204030204"/>
+        <a:ea typeface=""/>
+        <a:cs typeface=""/>
+        <a:font script="Jpan" typeface="游ゴシック Light"/>
+        <a:font script="Hang" typeface="맑은 고딕"/>
+        <a:font script="Hans" typeface="等线 Light"/>
+        <a:font script="Hant" typeface="新細明體"/>
+        <a:font script="Arab" typeface="Times New Roman"/>
+        <a:font script="Hebr" typeface="Times New Roman"/>
+        <a:font script="Thai" typeface="Angsana New"/>
+        <a:font script="Ethi" typeface="Nyala"/>
+        <a:font script="Beng" typeface="Vrinda"/>
+        <a:font script="Gujr" typeface="Shruti"/>
+        <a:font script="Khmr" typeface="MoolBoran"/>
+        <a:font script="Knda" typeface="Tunga"/>
+        <a:font script="Guru" typeface="Raavi"/>
+        <a:font script="Cans" typeface="Euphemia"/>
+        <a:font script="Cher" typeface="Plantagenet Cherokee"/>
+        <a:font script="Yiii" typeface="Microsoft Yi Baiti"/>
+        <a:font script="Tibt" typeface="Microsoft Himalaya"/>
+        <a:font script="Thaa" typeface="MV Boli"/>
+        <a:font script="Deva" typeface="Mangal"/>
+        <a:font script="Telu" typeface="Gautami"/>
+        <a:font script="Taml" typeface="Latha"/>
+        <a:font script="Syrc" typeface="Estrangelo Edessa"/>
+        <a:font script="Orya" typeface="Kalinga"/>
+        <a:font script="Mlym" typeface="Kartika"/>
+        <a:font script="Laoo" typeface="DokChampa"/>
+        <a:font script="Sinh" typeface="Iskoola Pota"/>
+        <a:font script="Mong" typeface="Mongolian Baiti"/>
+        <a:font script="Viet" typeface="Times New Roman"/>
+        <a:font script="Uigh" typeface="Microsoft Uighur"/>
+        <a:font script="Geor" typeface="Sylfaen"/>
+        <a:font script="Armn" typeface="Arial"/>
+        <a:font script="Bugi" typeface="Leelawadee UI"/>
+        <a:font script="Bopo" typeface="Microsoft JhengHei"/>
+        <a:font script="Java" typeface="Javanese Text"/>
+        <a:font script="Lisu" typeface="Segoe UI"/>
+        <a:font script="Mymr" typeface="Myanmar Text"/>
+        <a:font script="Nkoo" typeface="Ebrima"/>
+        <a:font script="Olck" typeface="Nirmala UI"/>
+        <a:font script="Osma" typeface="Ebrima"/>
+        <a:font script="Phag" typeface="Phagspa"/>
+        <a:font script="Syrn" typeface="Estrangelo Edessa"/>
+        <a:font script="Syrj" typeface="Estrangelo Edessa"/>
+        <a:font script="Syre" typeface="Estrangelo Edessa"/>
+        <a:font script="Sora" typeface="Nirmala UI"/>
+        <a:font script="Tale" typeface="Microsoft Tai Le"/>
+        <a:font script="Talu" typeface="Microsoft New Tai Lue"/>
+        <a:font script="Tfng" typeface="Ebrima"/>
+      </a:majorFont>
+      <a:minorFont>
+        <a:latin typeface="Calibri" panose="020F0502020204030204"/>
+        <a:ea typeface=""/>
+        <a:cs typeface=""/>
+        <a:font script="Jpan" typeface="游ゴシック"/>
+        <a:font script="Hang" typeface="맑은 고딕"/>
+        <a:font script="Hans" typeface="等线"/>
+        <a:font script="Hant" typeface="新細明體"/>
+        <a:font script="Arab" typeface="Arial"/>
+        <a:font script="Hebr" typeface="Arial"/>
+        <a:font script="Thai" typeface="Cordia New"/>
+        <a:font script="Ethi" typeface="Nyala"/>
+        <a:font script="Beng" typeface="Vrinda"/>
+        <a:font script="Gujr" typeface="Shruti"/>
+        <a:font script="Khmr" typeface="DaunPenh"/>
+        <a:font script="Knda" typeface="Tunga"/>
+        <a:font script="Guru" typeface="Raavi"/>
+        <a:font script="Cans" typeface="Euphemia"/>
+        <a:font script="Cher" typeface="Plantagenet Cherokee"/>
+        <a:font script="Yiii" typeface="Microsoft Yi Baiti"/>
+        <a:font script="Tibt" typeface="Microsoft Himalaya"/>
+        <a:font script="Thaa" typeface="MV Boli"/>
+        <a:font script="Deva" typeface="Mangal"/>
+        <a:font script="Telu" typeface="Gautami"/>
+        <a:font script="Taml" typeface="Latha"/>
+        <a:font script="Syrc" typeface="Estrangelo Edessa"/>
+        <a:font script="Orya" typeface="Kalinga"/>
+        <a:font script="Mlym" typeface="Kartika"/>
+        <a:font script="Laoo" typeface="DokChampa"/>
+        <a:font script="Sinh" typeface="Iskoola Pota"/>
+        <a:font script="Mong" typeface="Mongolian Baiti"/>
+        <a:font script="Viet" typeface="Arial"/>
+        <a:font script="Uigh" typeface="Microsoft Uighur"/>
+        <a:font script="Geor" typeface="Sylfaen"/>
+        <a:font script="Armn" typeface="Arial"/>
+        <a:font script="Bugi" typeface="Leelawadee UI"/>
+        <a:font script="Bopo" typeface="Microsoft JhengHei"/>
+        <a:font script="Java" typeface="Javanese Text"/>
+        <a:font script="Lisu" typeface="Segoe UI"/>
+        <a:font script="Mymr" typeface="Myanmar Text"/>
+        <a:font script="Nkoo" typeface="Ebrima"/>
+        <a:font script="Olck" typeface="Nirmala UI"/>
+        <a:font script="Osma" typeface="Ebrima"/>
+        <a:font script="Phag" typeface="Phagspa"/>
+        <a:font script="Syrn" typeface="Estrangelo Edessa"/>
+        <a:font script="Syrj" typeface="Estrangelo Edessa"/>
+        <a:font script="Syre" typeface="Estrangelo Edessa"/>
+        <a:font script="Sora" typeface="Nirmala UI"/>
+        <a:font script="Tale" typeface="Microsoft Tai Le"/>
+        <a:font script="Talu" typeface="Microsoft New Tai Lue"/>
+        <a:font script="Tfng" typeface="Ebrima"/>
+      </a:minorFont>
+    </a:fontScheme>
+    <a:fmtScheme name="Office">
+      <a:fillStyleLst>
+        <a:solidFill>
+          <a:schemeClr val="phClr"/>
+        </a:solidFill>
+        <a:gradFill rotWithShape="1">
+          <a:gsLst>
+            <a:gs pos="0">
+              <a:schemeClr val="phClr">
+                <a:lumMod val="110000"/>
+                <a:satMod val="105000"/>
+                <a:tint val="67000"/>
+              </a:schemeClr>
+            </a:gs>
+            <a:gs pos="50000">
+              <a:schemeClr val="phClr">
+                <a:lumMod val="105000"/>
+                <a:satMod val="103000"/>
+                <a:tint val="73000"/>
+              </a:schemeClr>
+            </a:gs>
+            <a:gs pos="100000">
+              <a:schemeClr val="phClr">
+                <a:lumMod val="105000"/>
+                <a:satMod val="109000"/>
+                <a:tint val="81000"/>
+              </a:schemeClr>
+            </a:gs>
+          </a:gsLst>
+          <a:lin ang="5400000" scaled="0"/>
+        </a:gradFill>
+        <a:gradFill rotWithShape="1">
+          <a:gsLst>
+            <a:gs pos="0">
+              <a:schemeClr val="phClr">
+                <a:satMod val="103000"/>
+                <a:lumMod val="102000"/>
+                <a:tint val="94000"/>
+              </a:schemeClr>
+            </a:gs>
+            <a:gs pos="50000">
+              <a:schemeClr val="phClr">
+                <a:satMod val="110000"/>
+                <a:lumMod val="100000"/>
+                <a:shade val="100000"/>
+              </a:schemeClr>
+            </a:gs>
+            <a:gs pos="100000">
+              <a:schemeClr val="phClr">
+                <a:lumMod val="99000"/>
+                <a:satMod val="120000"/>
+                <a:shade val="78000"/>
+              </a:schemeClr>
+            </a:gs>
+          </a:gsLst>
+          <a:lin ang="5400000" scaled="0"/>
+        </a:gradFill>
+      </a:fillStyleLst>
+      <a:lnStyleLst>
+        <a:ln w="6350" cap="flat" cmpd="sng" algn="ctr">
+          <a:solidFill>
+            <a:schemeClr val="phClr"/>
+          </a:solidFill>
+          <a:prstDash val="solid"/>
+          <a:miter lim="800000"/>
+        </a:ln>
+        <a:ln w="12700" cap="flat" cmpd="sng" algn="ctr">
+          <a:solidFill>
+            <a:schemeClr val="phClr"/>
+          </a:solidFill>
+          <a:prstDash val="solid"/>
+          <a:miter lim="800000"/>
+        </a:ln>
+        <a:ln w="19050" cap="flat" cmpd="sng" algn="ctr">
+          <a:solidFill>
+            <a:schemeClr val="phClr"/>
+          </a:solidFill>
+          <a:prstDash val="solid"/>
+          <a:miter lim="800000"/>
+        </a:ln>
+      </a:lnStyleLst>
+      <a:effectStyleLst>
+        <a:effectStyle>
+          <a:effectLst/>
+        </a:effectStyle>
+        <a:effectStyle>
+          <a:effectLst/>
+        </a:effectStyle>
+        <a:effectStyle>
+          <a:effectLst>
+            <a:outerShdw blurRad="57150" dist="19050" dir="5400000" algn="ctr" rotWithShape="0">
+              <a:srgbClr val="000000">
+                <a:alpha val="63000"/>
+              </a:srgbClr>
+            </a:outerShdw>
+          </a:effectLst>
+        </a:effectStyle>
+      </a:effectStyleLst>
+      <a:bgFillStyleLst>
+        <a:solidFill>
+          <a:schemeClr val="phClr"/>
+        </a:solidFill>
+        <a:solidFill>
+          <a:schemeClr val="phClr">
+            <a:tint val="95000"/>
+            <a:satMod val="170000"/>
+          </a:schemeClr>
+        </a:solidFill>
+        <a:gradFill rotWithShape="1">
+          <a:gsLst>
+            <a:gs pos="0">
+              <a:schemeClr val="phClr">
+                <a:tint val="93000"/>
+                <a:satMod val="150000"/>
+                <a:shade val="98000"/>
+                <a:lumMod val="102000"/>
+              </a:schemeClr>
+            </a:gs>
+            <a:gs pos="50000">
+              <a:schemeClr val="phClr">
+                <a:tint val="98000"/>
+                <a:satMod val="130000"/>
+                <a:shade val="90000"/>
+                <a:lumMod val="103000"/>
+              </a:schemeClr>
+            </a:gs>
+            <a:gs pos="100000">
+              <a:schemeClr val="phClr">
+                <a:shade val="63000"/>
+                <a:satMod val="120000"/>
+              </a:schemeClr>
+            </a:gs>
+          </a:gsLst>
+          <a:lin ang="5400000" scaled="0"/>
+        </a:gradFill>
+      </a:bgFillStyleLst>
+    </a:fmtScheme>
+  </a:themeElements>
+  <a:objectDefaults/>
+  <a:extraClrSchemeLst/>
+  <a:extLst>
+    <a:ext uri="{05A4C25C-085E-4340-85A3-A5531E510DB2}">
+      <thm15:themeFamily xmlns:thm15="http://schemas.microsoft.com/office/thememl/2012/main" name="Office Theme 2013 - 2022" id="{62F939B6-93AF-4DB8-9C6B-D6C7DFDC589F}" vid="{4A3C46E8-61CC-4603-A589-7422A47A8E4A}"/>
+    </a:ext>
+  </a:extLst>
+</a:theme>
 </file>
</xml_diff>